<commit_message>
DG ExportCsv Mechanism finished
</commit_message>
<xml_diff>
--- a/docs/diagrams/ExportCsvItemCommandSequenceDiagram.pptx
+++ b/docs/diagrams/ExportCsvItemCommandSequenceDiagram.pptx
@@ -10,7 +10,7 @@
   <p:sldIdLst>
     <p:sldId id="267" r:id="rId2"/>
   </p:sldIdLst>
-  <p:sldSz cx="19800888" cy="7199313"/>
+  <p:sldSz cx="21601113" cy="9359900"/>
   <p:notesSz cx="6858000" cy="9144000"/>
   <p:defaultTextStyle>
     <a:defPPr>
@@ -110,12 +110,12 @@
   <p:extLst>
     <p:ext uri="{EFAFB233-063F-42B5-8137-9DF3F51BA10A}">
       <p15:sldGuideLst xmlns:p15="http://schemas.microsoft.com/office/powerpoint/2012/main">
-        <p15:guide id="1" orient="horz" pos="1562" userDrawn="1">
+        <p15:guide id="1" orient="horz" pos="2031" userDrawn="1">
           <p15:clr>
             <a:srgbClr val="A4A3A4"/>
           </p15:clr>
         </p15:guide>
-        <p15:guide id="2" pos="6237" userDrawn="1">
+        <p15:guide id="2" pos="6804" userDrawn="1">
           <p15:clr>
             <a:srgbClr val="A4A3A4"/>
           </p15:clr>
@@ -226,8 +226,8 @@
         </p:nvSpPr>
         <p:spPr>
           <a:xfrm>
-            <a:off x="-1285875" y="685800"/>
-            <a:ext cx="9429750" cy="3429000"/>
+            <a:off x="-527050" y="685800"/>
+            <a:ext cx="7912100" cy="3429000"/>
           </a:xfrm>
           <a:prstGeom prst="rect">
             <a:avLst/>
@@ -504,8 +504,8 @@
         </p:nvSpPr>
         <p:spPr>
           <a:xfrm>
-            <a:off x="1485067" y="2236455"/>
-            <a:ext cx="16830756" cy="1543186"/>
+            <a:off x="1620084" y="2907638"/>
+            <a:ext cx="18360947" cy="2006312"/>
           </a:xfrm>
         </p:spPr>
         <p:txBody>
@@ -531,8 +531,8 @@
         </p:nvSpPr>
         <p:spPr>
           <a:xfrm>
-            <a:off x="2970134" y="4079611"/>
-            <a:ext cx="13860622" cy="1839824"/>
+            <a:off x="3240168" y="5303944"/>
+            <a:ext cx="15120780" cy="2391974"/>
           </a:xfrm>
         </p:spPr>
         <p:txBody>
@@ -548,7 +548,7 @@
                 </a:solidFill>
               </a:defRPr>
             </a:lvl1pPr>
-            <a:lvl2pPr marL="479969" indent="0" algn="ctr">
+            <a:lvl2pPr marL="479987" indent="0" algn="ctr">
               <a:buNone/>
               <a:defRPr>
                 <a:solidFill>
@@ -558,7 +558,7 @@
                 </a:solidFill>
               </a:defRPr>
             </a:lvl2pPr>
-            <a:lvl3pPr marL="959937" indent="0" algn="ctr">
+            <a:lvl3pPr marL="959972" indent="0" algn="ctr">
               <a:buNone/>
               <a:defRPr>
                 <a:solidFill>
@@ -568,7 +568,7 @@
                 </a:solidFill>
               </a:defRPr>
             </a:lvl3pPr>
-            <a:lvl4pPr marL="1439906" indent="0" algn="ctr">
+            <a:lvl4pPr marL="1439959" indent="0" algn="ctr">
               <a:buNone/>
               <a:defRPr>
                 <a:solidFill>
@@ -578,7 +578,7 @@
                 </a:solidFill>
               </a:defRPr>
             </a:lvl4pPr>
-            <a:lvl5pPr marL="1919874" indent="0" algn="ctr">
+            <a:lvl5pPr marL="1919945" indent="0" algn="ctr">
               <a:buNone/>
               <a:defRPr>
                 <a:solidFill>
@@ -588,7 +588,7 @@
                 </a:solidFill>
               </a:defRPr>
             </a:lvl5pPr>
-            <a:lvl6pPr marL="2399843" indent="0" algn="ctr">
+            <a:lvl6pPr marL="2399932" indent="0" algn="ctr">
               <a:buNone/>
               <a:defRPr>
                 <a:solidFill>
@@ -598,7 +598,7 @@
                 </a:solidFill>
               </a:defRPr>
             </a:lvl6pPr>
-            <a:lvl7pPr marL="2879811" indent="0" algn="ctr">
+            <a:lvl7pPr marL="2879917" indent="0" algn="ctr">
               <a:buNone/>
               <a:defRPr>
                 <a:solidFill>
@@ -608,7 +608,7 @@
                 </a:solidFill>
               </a:defRPr>
             </a:lvl7pPr>
-            <a:lvl8pPr marL="3359780" indent="0" algn="ctr">
+            <a:lvl8pPr marL="3359904" indent="0" algn="ctr">
               <a:buNone/>
               <a:defRPr>
                 <a:solidFill>
@@ -618,7 +618,7 @@
                 </a:solidFill>
               </a:defRPr>
             </a:lvl8pPr>
-            <a:lvl9pPr marL="3839748" indent="0" algn="ctr">
+            <a:lvl9pPr marL="3839889" indent="0" algn="ctr">
               <a:buNone/>
               <a:defRPr>
                 <a:solidFill>
@@ -912,8 +912,8 @@
         </p:nvSpPr>
         <p:spPr>
           <a:xfrm>
-            <a:off x="14355645" y="288309"/>
-            <a:ext cx="4455199" cy="6142747"/>
+            <a:off x="15660812" y="374834"/>
+            <a:ext cx="4860250" cy="7986248"/>
           </a:xfrm>
         </p:spPr>
         <p:txBody>
@@ -939,8 +939,8 @@
         </p:nvSpPr>
         <p:spPr>
           <a:xfrm>
-            <a:off x="990045" y="288309"/>
-            <a:ext cx="13035584" cy="6142747"/>
+            <a:off x="1080056" y="374834"/>
+            <a:ext cx="14220732" cy="7986248"/>
           </a:xfrm>
         </p:spPr>
         <p:txBody>
@@ -1258,8 +1258,8 @@
         </p:nvSpPr>
         <p:spPr>
           <a:xfrm>
-            <a:off x="1564133" y="4626227"/>
-            <a:ext cx="16830756" cy="1429864"/>
+            <a:off x="1706338" y="6014607"/>
+            <a:ext cx="18360947" cy="1858981"/>
           </a:xfrm>
         </p:spPr>
         <p:txBody>
@@ -1289,8 +1289,8 @@
         </p:nvSpPr>
         <p:spPr>
           <a:xfrm>
-            <a:off x="1564133" y="3051378"/>
-            <a:ext cx="16830756" cy="1574849"/>
+            <a:off x="1706338" y="3967131"/>
+            <a:ext cx="18360947" cy="2047477"/>
           </a:xfrm>
         </p:spPr>
         <p:txBody>
@@ -1306,7 +1306,7 @@
                 </a:solidFill>
               </a:defRPr>
             </a:lvl1pPr>
-            <a:lvl2pPr marL="479969" indent="0">
+            <a:lvl2pPr marL="479987" indent="0">
               <a:buNone/>
               <a:defRPr sz="1890">
                 <a:solidFill>
@@ -1316,7 +1316,7 @@
                 </a:solidFill>
               </a:defRPr>
             </a:lvl2pPr>
-            <a:lvl3pPr marL="959937" indent="0">
+            <a:lvl3pPr marL="959972" indent="0">
               <a:buNone/>
               <a:defRPr sz="1680">
                 <a:solidFill>
@@ -1326,7 +1326,7 @@
                 </a:solidFill>
               </a:defRPr>
             </a:lvl3pPr>
-            <a:lvl4pPr marL="1439906" indent="0">
+            <a:lvl4pPr marL="1439959" indent="0">
               <a:buNone/>
               <a:defRPr sz="1470">
                 <a:solidFill>
@@ -1336,7 +1336,7 @@
                 </a:solidFill>
               </a:defRPr>
             </a:lvl4pPr>
-            <a:lvl5pPr marL="1919874" indent="0">
+            <a:lvl5pPr marL="1919945" indent="0">
               <a:buNone/>
               <a:defRPr sz="1470">
                 <a:solidFill>
@@ -1346,7 +1346,7 @@
                 </a:solidFill>
               </a:defRPr>
             </a:lvl5pPr>
-            <a:lvl6pPr marL="2399843" indent="0">
+            <a:lvl6pPr marL="2399932" indent="0">
               <a:buNone/>
               <a:defRPr sz="1470">
                 <a:solidFill>
@@ -1356,7 +1356,7 @@
                 </a:solidFill>
               </a:defRPr>
             </a:lvl6pPr>
-            <a:lvl7pPr marL="2879811" indent="0">
+            <a:lvl7pPr marL="2879917" indent="0">
               <a:buNone/>
               <a:defRPr sz="1470">
                 <a:solidFill>
@@ -1366,7 +1366,7 @@
                 </a:solidFill>
               </a:defRPr>
             </a:lvl7pPr>
-            <a:lvl8pPr marL="3359780" indent="0">
+            <a:lvl8pPr marL="3359904" indent="0">
               <a:buNone/>
               <a:defRPr sz="1470">
                 <a:solidFill>
@@ -1376,7 +1376,7 @@
                 </a:solidFill>
               </a:defRPr>
             </a:lvl8pPr>
-            <a:lvl9pPr marL="3839748" indent="0">
+            <a:lvl9pPr marL="3839889" indent="0">
               <a:buNone/>
               <a:defRPr sz="1470">
                 <a:solidFill>
@@ -1525,8 +1525,8 @@
         </p:nvSpPr>
         <p:spPr>
           <a:xfrm>
-            <a:off x="990045" y="1679841"/>
-            <a:ext cx="8745393" cy="4751214"/>
+            <a:off x="1080060" y="2183978"/>
+            <a:ext cx="9540492" cy="6177102"/>
           </a:xfrm>
         </p:spPr>
         <p:txBody>
@@ -1609,8 +1609,8 @@
         </p:nvSpPr>
         <p:spPr>
           <a:xfrm>
-            <a:off x="10065451" y="1679841"/>
-            <a:ext cx="8745393" cy="4751214"/>
+            <a:off x="10980566" y="2183978"/>
+            <a:ext cx="9540492" cy="6177102"/>
           </a:xfrm>
         </p:spPr>
         <p:txBody>
@@ -1814,8 +1814,8 @@
         </p:nvSpPr>
         <p:spPr>
           <a:xfrm>
-            <a:off x="990045" y="1611513"/>
-            <a:ext cx="8748831" cy="671602"/>
+            <a:off x="1080060" y="2095145"/>
+            <a:ext cx="9544243" cy="873157"/>
           </a:xfrm>
         </p:spPr>
         <p:txBody>
@@ -1825,35 +1825,35 @@
               <a:buNone/>
               <a:defRPr sz="2520" b="1"/>
             </a:lvl1pPr>
-            <a:lvl2pPr marL="479969" indent="0">
+            <a:lvl2pPr marL="479987" indent="0">
               <a:buNone/>
               <a:defRPr sz="2100" b="1"/>
             </a:lvl2pPr>
-            <a:lvl3pPr marL="959937" indent="0">
+            <a:lvl3pPr marL="959972" indent="0">
               <a:buNone/>
               <a:defRPr sz="1890" b="1"/>
             </a:lvl3pPr>
-            <a:lvl4pPr marL="1439906" indent="0">
+            <a:lvl4pPr marL="1439959" indent="0">
               <a:buNone/>
               <a:defRPr sz="1680" b="1"/>
             </a:lvl4pPr>
-            <a:lvl5pPr marL="1919874" indent="0">
+            <a:lvl5pPr marL="1919945" indent="0">
               <a:buNone/>
               <a:defRPr sz="1680" b="1"/>
             </a:lvl5pPr>
-            <a:lvl6pPr marL="2399843" indent="0">
+            <a:lvl6pPr marL="2399932" indent="0">
               <a:buNone/>
               <a:defRPr sz="1680" b="1"/>
             </a:lvl6pPr>
-            <a:lvl7pPr marL="2879811" indent="0">
+            <a:lvl7pPr marL="2879917" indent="0">
               <a:buNone/>
               <a:defRPr sz="1680" b="1"/>
             </a:lvl7pPr>
-            <a:lvl8pPr marL="3359780" indent="0">
+            <a:lvl8pPr marL="3359904" indent="0">
               <a:buNone/>
               <a:defRPr sz="1680" b="1"/>
             </a:lvl8pPr>
-            <a:lvl9pPr marL="3839748" indent="0">
+            <a:lvl9pPr marL="3839889" indent="0">
               <a:buNone/>
               <a:defRPr sz="1680" b="1"/>
             </a:lvl9pPr>
@@ -1879,8 +1879,8 @@
         </p:nvSpPr>
         <p:spPr>
           <a:xfrm>
-            <a:off x="990045" y="2283115"/>
-            <a:ext cx="8748831" cy="4147938"/>
+            <a:off x="1080060" y="2968301"/>
+            <a:ext cx="9544243" cy="5392776"/>
           </a:xfrm>
         </p:spPr>
         <p:txBody>
@@ -1963,8 +1963,8 @@
         </p:nvSpPr>
         <p:spPr>
           <a:xfrm>
-            <a:off x="10058577" y="1611513"/>
-            <a:ext cx="8752268" cy="671602"/>
+            <a:off x="10973067" y="2095145"/>
+            <a:ext cx="9547992" cy="873157"/>
           </a:xfrm>
         </p:spPr>
         <p:txBody>
@@ -1974,35 +1974,35 @@
               <a:buNone/>
               <a:defRPr sz="2520" b="1"/>
             </a:lvl1pPr>
-            <a:lvl2pPr marL="479969" indent="0">
+            <a:lvl2pPr marL="479987" indent="0">
               <a:buNone/>
               <a:defRPr sz="2100" b="1"/>
             </a:lvl2pPr>
-            <a:lvl3pPr marL="959937" indent="0">
+            <a:lvl3pPr marL="959972" indent="0">
               <a:buNone/>
               <a:defRPr sz="1890" b="1"/>
             </a:lvl3pPr>
-            <a:lvl4pPr marL="1439906" indent="0">
+            <a:lvl4pPr marL="1439959" indent="0">
               <a:buNone/>
               <a:defRPr sz="1680" b="1"/>
             </a:lvl4pPr>
-            <a:lvl5pPr marL="1919874" indent="0">
+            <a:lvl5pPr marL="1919945" indent="0">
               <a:buNone/>
               <a:defRPr sz="1680" b="1"/>
             </a:lvl5pPr>
-            <a:lvl6pPr marL="2399843" indent="0">
+            <a:lvl6pPr marL="2399932" indent="0">
               <a:buNone/>
               <a:defRPr sz="1680" b="1"/>
             </a:lvl6pPr>
-            <a:lvl7pPr marL="2879811" indent="0">
+            <a:lvl7pPr marL="2879917" indent="0">
               <a:buNone/>
               <a:defRPr sz="1680" b="1"/>
             </a:lvl7pPr>
-            <a:lvl8pPr marL="3359780" indent="0">
+            <a:lvl8pPr marL="3359904" indent="0">
               <a:buNone/>
               <a:defRPr sz="1680" b="1"/>
             </a:lvl8pPr>
-            <a:lvl9pPr marL="3839748" indent="0">
+            <a:lvl9pPr marL="3839889" indent="0">
               <a:buNone/>
               <a:defRPr sz="1680" b="1"/>
             </a:lvl9pPr>
@@ -2028,8 +2028,8 @@
         </p:nvSpPr>
         <p:spPr>
           <a:xfrm>
-            <a:off x="10058577" y="2283115"/>
-            <a:ext cx="8752268" cy="4147938"/>
+            <a:off x="10973067" y="2968301"/>
+            <a:ext cx="9547992" cy="5392776"/>
           </a:xfrm>
         </p:spPr>
         <p:txBody>
@@ -2419,8 +2419,8 @@
         </p:nvSpPr>
         <p:spPr>
           <a:xfrm>
-            <a:off x="990046" y="286639"/>
-            <a:ext cx="6514355" cy="1219884"/>
+            <a:off x="1080061" y="372662"/>
+            <a:ext cx="7106617" cy="1585984"/>
           </a:xfrm>
         </p:spPr>
         <p:txBody>
@@ -2450,8 +2450,8 @@
         </p:nvSpPr>
         <p:spPr>
           <a:xfrm>
-            <a:off x="7741598" y="286641"/>
-            <a:ext cx="11069247" cy="6144414"/>
+            <a:off x="8445438" y="372666"/>
+            <a:ext cx="12075623" cy="7988415"/>
           </a:xfrm>
         </p:spPr>
         <p:txBody>
@@ -2534,8 +2534,8 @@
         </p:nvSpPr>
         <p:spPr>
           <a:xfrm>
-            <a:off x="990046" y="1506525"/>
-            <a:ext cx="6514355" cy="4924531"/>
+            <a:off x="1080061" y="1958651"/>
+            <a:ext cx="7106617" cy="6402433"/>
           </a:xfrm>
         </p:spPr>
         <p:txBody>
@@ -2545,35 +2545,35 @@
               <a:buNone/>
               <a:defRPr sz="1470"/>
             </a:lvl1pPr>
-            <a:lvl2pPr marL="479969" indent="0">
+            <a:lvl2pPr marL="479987" indent="0">
               <a:buNone/>
               <a:defRPr sz="1260"/>
             </a:lvl2pPr>
-            <a:lvl3pPr marL="959937" indent="0">
+            <a:lvl3pPr marL="959972" indent="0">
               <a:buNone/>
               <a:defRPr sz="1050"/>
             </a:lvl3pPr>
-            <a:lvl4pPr marL="1439906" indent="0">
+            <a:lvl4pPr marL="1439959" indent="0">
               <a:buNone/>
               <a:defRPr sz="945"/>
             </a:lvl4pPr>
-            <a:lvl5pPr marL="1919874" indent="0">
+            <a:lvl5pPr marL="1919945" indent="0">
               <a:buNone/>
               <a:defRPr sz="945"/>
             </a:lvl5pPr>
-            <a:lvl6pPr marL="2399843" indent="0">
+            <a:lvl6pPr marL="2399932" indent="0">
               <a:buNone/>
               <a:defRPr sz="945"/>
             </a:lvl6pPr>
-            <a:lvl7pPr marL="2879811" indent="0">
+            <a:lvl7pPr marL="2879917" indent="0">
               <a:buNone/>
               <a:defRPr sz="945"/>
             </a:lvl7pPr>
-            <a:lvl8pPr marL="3359780" indent="0">
+            <a:lvl8pPr marL="3359904" indent="0">
               <a:buNone/>
               <a:defRPr sz="945"/>
             </a:lvl8pPr>
-            <a:lvl9pPr marL="3839748" indent="0">
+            <a:lvl9pPr marL="3839889" indent="0">
               <a:buNone/>
               <a:defRPr sz="945"/>
             </a:lvl9pPr>
@@ -2694,8 +2694,8 @@
         </p:nvSpPr>
         <p:spPr>
           <a:xfrm>
-            <a:off x="3881112" y="5039519"/>
-            <a:ext cx="11880533" cy="594944"/>
+            <a:off x="4233972" y="6551932"/>
+            <a:ext cx="12960668" cy="773493"/>
           </a:xfrm>
         </p:spPr>
         <p:txBody>
@@ -2725,8 +2725,8 @@
         </p:nvSpPr>
         <p:spPr>
           <a:xfrm>
-            <a:off x="3881112" y="643272"/>
-            <a:ext cx="11880533" cy="4319588"/>
+            <a:off x="4233972" y="836325"/>
+            <a:ext cx="12960668" cy="5615940"/>
           </a:xfrm>
         </p:spPr>
         <p:txBody>
@@ -2736,35 +2736,35 @@
               <a:buNone/>
               <a:defRPr sz="3359"/>
             </a:lvl1pPr>
-            <a:lvl2pPr marL="479969" indent="0">
+            <a:lvl2pPr marL="479987" indent="0">
               <a:buNone/>
               <a:defRPr sz="2939"/>
             </a:lvl2pPr>
-            <a:lvl3pPr marL="959937" indent="0">
+            <a:lvl3pPr marL="959972" indent="0">
               <a:buNone/>
               <a:defRPr sz="2520"/>
             </a:lvl3pPr>
-            <a:lvl4pPr marL="1439906" indent="0">
+            <a:lvl4pPr marL="1439959" indent="0">
               <a:buNone/>
               <a:defRPr sz="2100"/>
             </a:lvl4pPr>
-            <a:lvl5pPr marL="1919874" indent="0">
+            <a:lvl5pPr marL="1919945" indent="0">
               <a:buNone/>
               <a:defRPr sz="2100"/>
             </a:lvl5pPr>
-            <a:lvl6pPr marL="2399843" indent="0">
+            <a:lvl6pPr marL="2399932" indent="0">
               <a:buNone/>
               <a:defRPr sz="2100"/>
             </a:lvl6pPr>
-            <a:lvl7pPr marL="2879811" indent="0">
+            <a:lvl7pPr marL="2879917" indent="0">
               <a:buNone/>
               <a:defRPr sz="2100"/>
             </a:lvl7pPr>
-            <a:lvl8pPr marL="3359780" indent="0">
+            <a:lvl8pPr marL="3359904" indent="0">
               <a:buNone/>
               <a:defRPr sz="2100"/>
             </a:lvl8pPr>
-            <a:lvl9pPr marL="3839748" indent="0">
+            <a:lvl9pPr marL="3839889" indent="0">
               <a:buNone/>
               <a:defRPr sz="2100"/>
             </a:lvl9pPr>
@@ -2786,8 +2786,8 @@
         </p:nvSpPr>
         <p:spPr>
           <a:xfrm>
-            <a:off x="3881112" y="5634464"/>
-            <a:ext cx="11880533" cy="844919"/>
+            <a:off x="4233972" y="7325424"/>
+            <a:ext cx="12960668" cy="1098488"/>
           </a:xfrm>
         </p:spPr>
         <p:txBody>
@@ -2797,35 +2797,35 @@
               <a:buNone/>
               <a:defRPr sz="1470"/>
             </a:lvl1pPr>
-            <a:lvl2pPr marL="479969" indent="0">
+            <a:lvl2pPr marL="479987" indent="0">
               <a:buNone/>
               <a:defRPr sz="1260"/>
             </a:lvl2pPr>
-            <a:lvl3pPr marL="959937" indent="0">
+            <a:lvl3pPr marL="959972" indent="0">
               <a:buNone/>
               <a:defRPr sz="1050"/>
             </a:lvl3pPr>
-            <a:lvl4pPr marL="1439906" indent="0">
+            <a:lvl4pPr marL="1439959" indent="0">
               <a:buNone/>
               <a:defRPr sz="945"/>
             </a:lvl4pPr>
-            <a:lvl5pPr marL="1919874" indent="0">
+            <a:lvl5pPr marL="1919945" indent="0">
               <a:buNone/>
               <a:defRPr sz="945"/>
             </a:lvl5pPr>
-            <a:lvl6pPr marL="2399843" indent="0">
+            <a:lvl6pPr marL="2399932" indent="0">
               <a:buNone/>
               <a:defRPr sz="945"/>
             </a:lvl6pPr>
-            <a:lvl7pPr marL="2879811" indent="0">
+            <a:lvl7pPr marL="2879917" indent="0">
               <a:buNone/>
               <a:defRPr sz="945"/>
             </a:lvl7pPr>
-            <a:lvl8pPr marL="3359780" indent="0">
+            <a:lvl8pPr marL="3359904" indent="0">
               <a:buNone/>
               <a:defRPr sz="945"/>
             </a:lvl8pPr>
-            <a:lvl9pPr marL="3839748" indent="0">
+            <a:lvl9pPr marL="3839889" indent="0">
               <a:buNone/>
               <a:defRPr sz="945"/>
             </a:lvl9pPr>
@@ -2951,8 +2951,8 @@
         </p:nvSpPr>
         <p:spPr>
           <a:xfrm>
-            <a:off x="990045" y="288306"/>
-            <a:ext cx="17820799" cy="1199886"/>
+            <a:off x="1080060" y="374830"/>
+            <a:ext cx="19441001" cy="1559984"/>
           </a:xfrm>
           <a:prstGeom prst="rect">
             <a:avLst/>
@@ -2983,8 +2983,8 @@
         </p:nvSpPr>
         <p:spPr>
           <a:xfrm>
-            <a:off x="990045" y="1679841"/>
-            <a:ext cx="17820799" cy="4751214"/>
+            <a:off x="1080060" y="2183978"/>
+            <a:ext cx="19441001" cy="6177102"/>
           </a:xfrm>
           <a:prstGeom prst="rect">
             <a:avLst/>
@@ -3044,8 +3044,8 @@
         </p:nvSpPr>
         <p:spPr>
           <a:xfrm>
-            <a:off x="990045" y="6672699"/>
-            <a:ext cx="4620207" cy="383297"/>
+            <a:off x="1080060" y="8675246"/>
+            <a:ext cx="5040259" cy="498328"/>
           </a:xfrm>
           <a:prstGeom prst="rect">
             <a:avLst/>
@@ -3085,8 +3085,8 @@
         </p:nvSpPr>
         <p:spPr>
           <a:xfrm>
-            <a:off x="6765304" y="6672699"/>
-            <a:ext cx="6270282" cy="383297"/>
+            <a:off x="7380381" y="8675246"/>
+            <a:ext cx="6840353" cy="498328"/>
           </a:xfrm>
           <a:prstGeom prst="rect">
             <a:avLst/>
@@ -3122,8 +3122,8 @@
         </p:nvSpPr>
         <p:spPr>
           <a:xfrm>
-            <a:off x="14190637" y="6672699"/>
-            <a:ext cx="4620207" cy="383297"/>
+            <a:off x="15480802" y="8675246"/>
+            <a:ext cx="5040259" cy="498328"/>
           </a:xfrm>
           <a:prstGeom prst="rect">
             <a:avLst/>
@@ -3174,7 +3174,7 @@
   </p:sldLayoutIdLst>
   <p:txStyles>
     <p:titleStyle>
-      <a:lvl1pPr algn="ctr" defTabSz="959937" rtl="0" eaLnBrk="1" latinLnBrk="0" hangingPunct="1">
+      <a:lvl1pPr algn="ctr" defTabSz="959972" rtl="0" eaLnBrk="1" latinLnBrk="0" hangingPunct="1">
         <a:spcBef>
           <a:spcPct val="0"/>
         </a:spcBef>
@@ -3190,7 +3190,7 @@
       </a:lvl1pPr>
     </p:titleStyle>
     <p:bodyStyle>
-      <a:lvl1pPr marL="359976" indent="-359976" algn="l" defTabSz="959937" rtl="0" eaLnBrk="1" latinLnBrk="0" hangingPunct="1">
+      <a:lvl1pPr marL="359989" indent="-359989" algn="l" defTabSz="959972" rtl="0" eaLnBrk="1" latinLnBrk="0" hangingPunct="1">
         <a:spcBef>
           <a:spcPct val="20000"/>
         </a:spcBef>
@@ -3205,7 +3205,7 @@
           <a:cs typeface="+mn-cs"/>
         </a:defRPr>
       </a:lvl1pPr>
-      <a:lvl2pPr marL="779949" indent="-299980" algn="l" defTabSz="959937" rtl="0" eaLnBrk="1" latinLnBrk="0" hangingPunct="1">
+      <a:lvl2pPr marL="779978" indent="-299991" algn="l" defTabSz="959972" rtl="0" eaLnBrk="1" latinLnBrk="0" hangingPunct="1">
         <a:spcBef>
           <a:spcPct val="20000"/>
         </a:spcBef>
@@ -3220,7 +3220,7 @@
           <a:cs typeface="+mn-cs"/>
         </a:defRPr>
       </a:lvl2pPr>
-      <a:lvl3pPr marL="1199921" indent="-239984" algn="l" defTabSz="959937" rtl="0" eaLnBrk="1" latinLnBrk="0" hangingPunct="1">
+      <a:lvl3pPr marL="1199965" indent="-239993" algn="l" defTabSz="959972" rtl="0" eaLnBrk="1" latinLnBrk="0" hangingPunct="1">
         <a:spcBef>
           <a:spcPct val="20000"/>
         </a:spcBef>
@@ -3235,7 +3235,7 @@
           <a:cs typeface="+mn-cs"/>
         </a:defRPr>
       </a:lvl3pPr>
-      <a:lvl4pPr marL="1679890" indent="-239984" algn="l" defTabSz="959937" rtl="0" eaLnBrk="1" latinLnBrk="0" hangingPunct="1">
+      <a:lvl4pPr marL="1679952" indent="-239993" algn="l" defTabSz="959972" rtl="0" eaLnBrk="1" latinLnBrk="0" hangingPunct="1">
         <a:spcBef>
           <a:spcPct val="20000"/>
         </a:spcBef>
@@ -3250,7 +3250,7 @@
           <a:cs typeface="+mn-cs"/>
         </a:defRPr>
       </a:lvl4pPr>
-      <a:lvl5pPr marL="2159859" indent="-239984" algn="l" defTabSz="959937" rtl="0" eaLnBrk="1" latinLnBrk="0" hangingPunct="1">
+      <a:lvl5pPr marL="2159939" indent="-239993" algn="l" defTabSz="959972" rtl="0" eaLnBrk="1" latinLnBrk="0" hangingPunct="1">
         <a:spcBef>
           <a:spcPct val="20000"/>
         </a:spcBef>
@@ -3265,7 +3265,7 @@
           <a:cs typeface="+mn-cs"/>
         </a:defRPr>
       </a:lvl5pPr>
-      <a:lvl6pPr marL="2639827" indent="-239984" algn="l" defTabSz="959937" rtl="0" eaLnBrk="1" latinLnBrk="0" hangingPunct="1">
+      <a:lvl6pPr marL="2639924" indent="-239993" algn="l" defTabSz="959972" rtl="0" eaLnBrk="1" latinLnBrk="0" hangingPunct="1">
         <a:spcBef>
           <a:spcPct val="20000"/>
         </a:spcBef>
@@ -3280,7 +3280,7 @@
           <a:cs typeface="+mn-cs"/>
         </a:defRPr>
       </a:lvl6pPr>
-      <a:lvl7pPr marL="3119796" indent="-239984" algn="l" defTabSz="959937" rtl="0" eaLnBrk="1" latinLnBrk="0" hangingPunct="1">
+      <a:lvl7pPr marL="3119911" indent="-239993" algn="l" defTabSz="959972" rtl="0" eaLnBrk="1" latinLnBrk="0" hangingPunct="1">
         <a:spcBef>
           <a:spcPct val="20000"/>
         </a:spcBef>
@@ -3295,7 +3295,7 @@
           <a:cs typeface="+mn-cs"/>
         </a:defRPr>
       </a:lvl7pPr>
-      <a:lvl8pPr marL="3599764" indent="-239984" algn="l" defTabSz="959937" rtl="0" eaLnBrk="1" latinLnBrk="0" hangingPunct="1">
+      <a:lvl8pPr marL="3599897" indent="-239993" algn="l" defTabSz="959972" rtl="0" eaLnBrk="1" latinLnBrk="0" hangingPunct="1">
         <a:spcBef>
           <a:spcPct val="20000"/>
         </a:spcBef>
@@ -3310,7 +3310,7 @@
           <a:cs typeface="+mn-cs"/>
         </a:defRPr>
       </a:lvl8pPr>
-      <a:lvl9pPr marL="4079733" indent="-239984" algn="l" defTabSz="959937" rtl="0" eaLnBrk="1" latinLnBrk="0" hangingPunct="1">
+      <a:lvl9pPr marL="4079884" indent="-239993" algn="l" defTabSz="959972" rtl="0" eaLnBrk="1" latinLnBrk="0" hangingPunct="1">
         <a:spcBef>
           <a:spcPct val="20000"/>
         </a:spcBef>
@@ -3330,7 +3330,7 @@
       <a:defPPr>
         <a:defRPr lang="en-US"/>
       </a:defPPr>
-      <a:lvl1pPr marL="0" algn="l" defTabSz="959937" rtl="0" eaLnBrk="1" latinLnBrk="0" hangingPunct="1">
+      <a:lvl1pPr marL="0" algn="l" defTabSz="959972" rtl="0" eaLnBrk="1" latinLnBrk="0" hangingPunct="1">
         <a:defRPr sz="1890" kern="1200">
           <a:solidFill>
             <a:schemeClr val="tx1"/>
@@ -3340,7 +3340,7 @@
           <a:cs typeface="+mn-cs"/>
         </a:defRPr>
       </a:lvl1pPr>
-      <a:lvl2pPr marL="479969" algn="l" defTabSz="959937" rtl="0" eaLnBrk="1" latinLnBrk="0" hangingPunct="1">
+      <a:lvl2pPr marL="479987" algn="l" defTabSz="959972" rtl="0" eaLnBrk="1" latinLnBrk="0" hangingPunct="1">
         <a:defRPr sz="1890" kern="1200">
           <a:solidFill>
             <a:schemeClr val="tx1"/>
@@ -3350,7 +3350,7 @@
           <a:cs typeface="+mn-cs"/>
         </a:defRPr>
       </a:lvl2pPr>
-      <a:lvl3pPr marL="959937" algn="l" defTabSz="959937" rtl="0" eaLnBrk="1" latinLnBrk="0" hangingPunct="1">
+      <a:lvl3pPr marL="959972" algn="l" defTabSz="959972" rtl="0" eaLnBrk="1" latinLnBrk="0" hangingPunct="1">
         <a:defRPr sz="1890" kern="1200">
           <a:solidFill>
             <a:schemeClr val="tx1"/>
@@ -3360,7 +3360,7 @@
           <a:cs typeface="+mn-cs"/>
         </a:defRPr>
       </a:lvl3pPr>
-      <a:lvl4pPr marL="1439906" algn="l" defTabSz="959937" rtl="0" eaLnBrk="1" latinLnBrk="0" hangingPunct="1">
+      <a:lvl4pPr marL="1439959" algn="l" defTabSz="959972" rtl="0" eaLnBrk="1" latinLnBrk="0" hangingPunct="1">
         <a:defRPr sz="1890" kern="1200">
           <a:solidFill>
             <a:schemeClr val="tx1"/>
@@ -3370,7 +3370,7 @@
           <a:cs typeface="+mn-cs"/>
         </a:defRPr>
       </a:lvl4pPr>
-      <a:lvl5pPr marL="1919874" algn="l" defTabSz="959937" rtl="0" eaLnBrk="1" latinLnBrk="0" hangingPunct="1">
+      <a:lvl5pPr marL="1919945" algn="l" defTabSz="959972" rtl="0" eaLnBrk="1" latinLnBrk="0" hangingPunct="1">
         <a:defRPr sz="1890" kern="1200">
           <a:solidFill>
             <a:schemeClr val="tx1"/>
@@ -3380,7 +3380,7 @@
           <a:cs typeface="+mn-cs"/>
         </a:defRPr>
       </a:lvl5pPr>
-      <a:lvl6pPr marL="2399843" algn="l" defTabSz="959937" rtl="0" eaLnBrk="1" latinLnBrk="0" hangingPunct="1">
+      <a:lvl6pPr marL="2399932" algn="l" defTabSz="959972" rtl="0" eaLnBrk="1" latinLnBrk="0" hangingPunct="1">
         <a:defRPr sz="1890" kern="1200">
           <a:solidFill>
             <a:schemeClr val="tx1"/>
@@ -3390,7 +3390,7 @@
           <a:cs typeface="+mn-cs"/>
         </a:defRPr>
       </a:lvl6pPr>
-      <a:lvl7pPr marL="2879811" algn="l" defTabSz="959937" rtl="0" eaLnBrk="1" latinLnBrk="0" hangingPunct="1">
+      <a:lvl7pPr marL="2879917" algn="l" defTabSz="959972" rtl="0" eaLnBrk="1" latinLnBrk="0" hangingPunct="1">
         <a:defRPr sz="1890" kern="1200">
           <a:solidFill>
             <a:schemeClr val="tx1"/>
@@ -3400,7 +3400,7 @@
           <a:cs typeface="+mn-cs"/>
         </a:defRPr>
       </a:lvl7pPr>
-      <a:lvl8pPr marL="3359780" algn="l" defTabSz="959937" rtl="0" eaLnBrk="1" latinLnBrk="0" hangingPunct="1">
+      <a:lvl8pPr marL="3359904" algn="l" defTabSz="959972" rtl="0" eaLnBrk="1" latinLnBrk="0" hangingPunct="1">
         <a:defRPr sz="1890" kern="1200">
           <a:solidFill>
             <a:schemeClr val="tx1"/>
@@ -3410,7 +3410,7 @@
           <a:cs typeface="+mn-cs"/>
         </a:defRPr>
       </a:lvl8pPr>
-      <a:lvl9pPr marL="3839748" algn="l" defTabSz="959937" rtl="0" eaLnBrk="1" latinLnBrk="0" hangingPunct="1">
+      <a:lvl9pPr marL="3839889" algn="l" defTabSz="959972" rtl="0" eaLnBrk="1" latinLnBrk="0" hangingPunct="1">
         <a:defRPr sz="1890" kern="1200">
           <a:solidFill>
             <a:schemeClr val="tx1"/>
@@ -3444,25 +3444,28 @@
       </p:grpSpPr>
       <p:sp>
         <p:nvSpPr>
-          <p:cNvPr id="48" name="Rectangle 65"/>
+          <p:cNvPr id="62" name="Rectangle 65">
+            <a:extLst>
+              <a:ext uri="{FF2B5EF4-FFF2-40B4-BE49-F238E27FC236}">
+                <a16:creationId xmlns:a16="http://schemas.microsoft.com/office/drawing/2014/main" id="{CB426265-4E38-4A1D-8947-C1E1BA7A9C10}"/>
+              </a:ext>
+            </a:extLst>
+          </p:cNvPr>
           <p:cNvSpPr/>
           <p:nvPr/>
         </p:nvSpPr>
         <p:spPr>
           <a:xfrm>
-            <a:off x="11693309" y="1039901"/>
-            <a:ext cx="7042350" cy="5439189"/>
+            <a:off x="11817129" y="2146090"/>
+            <a:ext cx="1420909" cy="5962861"/>
           </a:xfrm>
           <a:prstGeom prst="roundRect">
             <a:avLst>
-              <a:gd name="adj" fmla="val 3484"/>
+              <a:gd name="adj" fmla="val 18517"/>
             </a:avLst>
           </a:prstGeom>
           <a:solidFill>
-            <a:schemeClr val="accent6">
-              <a:lumMod val="20000"/>
-              <a:lumOff val="80000"/>
-            </a:schemeClr>
+            <a:srgbClr val="87C7D9"/>
           </a:solidFill>
           <a:ln w="19050">
             <a:noFill/>
@@ -3488,20 +3491,16 @@
           <a:lstStyle/>
           <a:p>
             <a:r>
-              <a:rPr lang="en-US" sz="1260" b="1" dirty="0">
+              <a:rPr lang="en-US" altLang="zh-CN" sz="1260" b="1" dirty="0">
                 <a:solidFill>
-                  <a:schemeClr val="accent6">
-                    <a:lumMod val="75000"/>
-                  </a:schemeClr>
+                  <a:srgbClr val="31859C"/>
                 </a:solidFill>
               </a:rPr>
-              <a:t>Storage</a:t>
+              <a:t>Commons</a:t>
             </a:r>
             <a:endParaRPr lang="en-SG" sz="1260" b="1" dirty="0">
               <a:solidFill>
-                <a:schemeClr val="accent6">
-                  <a:lumMod val="75000"/>
-                </a:schemeClr>
+                <a:srgbClr val="31859C"/>
               </a:solidFill>
             </a:endParaRPr>
           </a:p>
@@ -3509,14 +3508,14 @@
       </p:sp>
       <p:sp>
         <p:nvSpPr>
-          <p:cNvPr id="81" name="Rectangle 65"/>
+          <p:cNvPr id="48" name="Rectangle 65"/>
           <p:cNvSpPr/>
           <p:nvPr/>
         </p:nvSpPr>
         <p:spPr>
           <a:xfrm>
-            <a:off x="2204245" y="1039901"/>
-            <a:ext cx="9321893" cy="5439481"/>
+            <a:off x="13238956" y="2120197"/>
+            <a:ext cx="7042350" cy="5962859"/>
           </a:xfrm>
           <a:prstGeom prst="roundRect">
             <a:avLst>
@@ -3524,7 +3523,7 @@
             </a:avLst>
           </a:prstGeom>
           <a:solidFill>
-            <a:schemeClr val="accent1">
+            <a:schemeClr val="accent6">
               <a:lumMod val="20000"/>
               <a:lumOff val="80000"/>
             </a:schemeClr>
@@ -3555,14 +3554,18 @@
             <a:r>
               <a:rPr lang="en-US" sz="1260" b="1" dirty="0">
                 <a:solidFill>
-                  <a:srgbClr val="0070C0"/>
+                  <a:schemeClr val="accent6">
+                    <a:lumMod val="75000"/>
+                  </a:schemeClr>
                 </a:solidFill>
               </a:rPr>
-              <a:t>Logic</a:t>
+              <a:t>Storage</a:t>
             </a:r>
             <a:endParaRPr lang="en-SG" sz="1260" b="1" dirty="0">
               <a:solidFill>
-                <a:srgbClr val="0070C0"/>
+                <a:schemeClr val="accent6">
+                  <a:lumMod val="75000"/>
+                </a:schemeClr>
               </a:solidFill>
             </a:endParaRPr>
           </a:p>
@@ -3570,25 +3573,28 @@
       </p:sp>
       <p:sp>
         <p:nvSpPr>
-          <p:cNvPr id="2" name="Rectangle 62"/>
+          <p:cNvPr id="81" name="Rectangle 65"/>
           <p:cNvSpPr/>
           <p:nvPr/>
         </p:nvSpPr>
         <p:spPr>
           <a:xfrm>
-            <a:off x="2428772" y="1370941"/>
-            <a:ext cx="1528073" cy="364018"/>
-          </a:xfrm>
-          <a:prstGeom prst="rect">
-            <a:avLst/>
+            <a:off x="2559022" y="2120197"/>
+            <a:ext cx="9254888" cy="5988755"/>
+          </a:xfrm>
+          <a:prstGeom prst="roundRect">
+            <a:avLst>
+              <a:gd name="adj" fmla="val 3484"/>
+            </a:avLst>
           </a:prstGeom>
           <a:solidFill>
-            <a:srgbClr val="0070C0"/>
+            <a:schemeClr val="accent1">
+              <a:lumMod val="20000"/>
+              <a:lumOff val="80000"/>
+            </a:schemeClr>
           </a:solidFill>
           <a:ln w="19050">
-            <a:solidFill>
-              <a:srgbClr val="0070C0"/>
-            </a:solidFill>
+            <a:noFill/>
           </a:ln>
           <a:effectLst/>
         </p:spPr>
@@ -3607,6 +3613,64 @@
           </a:fontRef>
         </p:style>
         <p:txBody>
+          <a:bodyPr rtlCol="0" anchor="t"/>
+          <a:lstStyle/>
+          <a:p>
+            <a:r>
+              <a:rPr lang="en-US" sz="1260" b="1" dirty="0">
+                <a:solidFill>
+                  <a:srgbClr val="0070C0"/>
+                </a:solidFill>
+              </a:rPr>
+              <a:t>Logic</a:t>
+            </a:r>
+            <a:endParaRPr lang="en-SG" sz="1260" b="1" dirty="0">
+              <a:solidFill>
+                <a:srgbClr val="0070C0"/>
+              </a:solidFill>
+            </a:endParaRPr>
+          </a:p>
+        </p:txBody>
+      </p:sp>
+      <p:sp>
+        <p:nvSpPr>
+          <p:cNvPr id="2" name="Rectangle 62"/>
+          <p:cNvSpPr/>
+          <p:nvPr/>
+        </p:nvSpPr>
+        <p:spPr>
+          <a:xfrm>
+            <a:off x="2783550" y="2451235"/>
+            <a:ext cx="1528073" cy="364018"/>
+          </a:xfrm>
+          <a:prstGeom prst="rect">
+            <a:avLst/>
+          </a:prstGeom>
+          <a:solidFill>
+            <a:srgbClr val="0070C0"/>
+          </a:solidFill>
+          <a:ln w="19050">
+            <a:solidFill>
+              <a:srgbClr val="0070C0"/>
+            </a:solidFill>
+          </a:ln>
+          <a:effectLst/>
+        </p:spPr>
+        <p:style>
+          <a:lnRef idx="1">
+            <a:schemeClr val="accent2"/>
+          </a:lnRef>
+          <a:fillRef idx="2">
+            <a:schemeClr val="accent2"/>
+          </a:fillRef>
+          <a:effectRef idx="1">
+            <a:schemeClr val="accent2"/>
+          </a:effectRef>
+          <a:fontRef idx="minor">
+            <a:schemeClr val="dk1"/>
+          </a:fontRef>
+        </p:style>
+        <p:txBody>
           <a:bodyPr rtlCol="0" anchor="ctr"/>
           <a:lstStyle/>
           <a:p>
@@ -3638,13 +3702,15 @@
       <p:cxnSp>
         <p:nvCxnSpPr>
           <p:cNvPr id="5" name="Straight Connector 4"/>
-          <p:cNvCxnSpPr/>
+          <p:cNvCxnSpPr>
+            <a:cxnSpLocks/>
+          </p:cNvCxnSpPr>
           <p:nvPr/>
         </p:nvCxnSpPr>
         <p:spPr>
           <a:xfrm>
-            <a:off x="3192806" y="1752714"/>
-            <a:ext cx="0" cy="2726861"/>
+            <a:off x="3547582" y="2738554"/>
+            <a:ext cx="0" cy="5370399"/>
           </a:xfrm>
           <a:prstGeom prst="line">
             <a:avLst/>
@@ -3680,8 +3746,8 @@
         </p:nvSpPr>
         <p:spPr>
           <a:xfrm>
-            <a:off x="3117214" y="2120860"/>
-            <a:ext cx="149300" cy="4198537"/>
+            <a:off x="3441026" y="3201157"/>
+            <a:ext cx="241021" cy="4755385"/>
           </a:xfrm>
           <a:prstGeom prst="rect">
             <a:avLst/>
@@ -3727,7 +3793,7 @@
         </p:nvSpPr>
         <p:spPr>
           <a:xfrm>
-            <a:off x="5206741" y="1247869"/>
+            <a:off x="5561517" y="2328163"/>
             <a:ext cx="1279878" cy="490960"/>
           </a:xfrm>
           <a:prstGeom prst="rect">
@@ -3797,7 +3863,7 @@
         </p:nvCxnSpPr>
         <p:spPr>
           <a:xfrm>
-            <a:off x="5850668" y="1756582"/>
+            <a:off x="6205444" y="2836877"/>
             <a:ext cx="0" cy="1779750"/>
           </a:xfrm>
           <a:prstGeom prst="line">
@@ -3834,7 +3900,7 @@
         </p:nvSpPr>
         <p:spPr>
           <a:xfrm>
-            <a:off x="5775078" y="2237579"/>
+            <a:off x="6129857" y="3317876"/>
             <a:ext cx="183635" cy="1185671"/>
           </a:xfrm>
           <a:prstGeom prst="rect">
@@ -3881,7 +3947,7 @@
         </p:nvSpPr>
         <p:spPr>
           <a:xfrm>
-            <a:off x="8681245" y="2437709"/>
+            <a:off x="9036024" y="3518003"/>
             <a:ext cx="1706925" cy="484508"/>
           </a:xfrm>
           <a:prstGeom prst="rect">
@@ -3951,14 +4017,15 @@
         <p:nvCxnSpPr>
           <p:cNvPr id="20" name="Straight Connector 19"/>
           <p:cNvCxnSpPr>
+            <a:cxnSpLocks/>
             <a:stCxn id="21" idx="0"/>
           </p:cNvCxnSpPr>
           <p:nvPr/>
         </p:nvCxnSpPr>
         <p:spPr>
           <a:xfrm flipH="1">
-            <a:off x="9413767" y="2922219"/>
-            <a:ext cx="22885" cy="3397178"/>
+            <a:off x="9776060" y="4002514"/>
+            <a:ext cx="15371" cy="3954028"/>
           </a:xfrm>
           <a:prstGeom prst="line">
             <a:avLst/>
@@ -3994,7 +4061,7 @@
         </p:nvSpPr>
         <p:spPr>
           <a:xfrm>
-            <a:off x="9356659" y="2922220"/>
+            <a:off x="9711437" y="4002517"/>
             <a:ext cx="159985" cy="289739"/>
           </a:xfrm>
           <a:prstGeom prst="rect">
@@ -4043,7 +4110,7 @@
         </p:nvCxnSpPr>
         <p:spPr>
           <a:xfrm>
-            <a:off x="504496" y="2120860"/>
+            <a:off x="859272" y="3201156"/>
             <a:ext cx="2612720" cy="3871"/>
           </a:xfrm>
           <a:prstGeom prst="straightConnector1">
@@ -4081,7 +4148,7 @@
         </p:nvCxnSpPr>
         <p:spPr>
           <a:xfrm>
-            <a:off x="3211589" y="2237581"/>
+            <a:off x="3566365" y="3317875"/>
             <a:ext cx="2526928" cy="0"/>
           </a:xfrm>
           <a:prstGeom prst="straightConnector1">
@@ -4117,7 +4184,7 @@
         </p:nvSpPr>
         <p:spPr>
           <a:xfrm>
-            <a:off x="387380" y="1871213"/>
+            <a:off x="742157" y="2951509"/>
             <a:ext cx="2605447" cy="193899"/>
           </a:xfrm>
           <a:prstGeom prst="rect">
@@ -4169,7 +4236,7 @@
         </p:nvCxnSpPr>
         <p:spPr>
           <a:xfrm flipV="1">
-            <a:off x="7845878" y="2847619"/>
+            <a:off x="8200654" y="3927914"/>
             <a:ext cx="835366" cy="2"/>
           </a:xfrm>
           <a:prstGeom prst="straightConnector1">
@@ -4205,7 +4272,7 @@
         </p:nvSpPr>
         <p:spPr>
           <a:xfrm>
-            <a:off x="6462952" y="3423249"/>
+            <a:off x="6817730" y="4503542"/>
             <a:ext cx="898401" cy="226216"/>
           </a:xfrm>
           <a:prstGeom prst="rect">
@@ -4245,7 +4312,7 @@
         </p:nvCxnSpPr>
         <p:spPr>
           <a:xfrm>
-            <a:off x="7846490" y="3211957"/>
+            <a:off x="8201269" y="4292251"/>
             <a:ext cx="1567277" cy="0"/>
           </a:xfrm>
           <a:prstGeom prst="straightConnector1">
@@ -4285,7 +4352,7 @@
         </p:nvCxnSpPr>
         <p:spPr>
           <a:xfrm>
-            <a:off x="3283601" y="3414509"/>
+            <a:off x="3638378" y="4494803"/>
             <a:ext cx="2472694" cy="0"/>
           </a:xfrm>
           <a:prstGeom prst="straightConnector1">
@@ -4325,7 +4392,7 @@
         </p:nvCxnSpPr>
         <p:spPr>
           <a:xfrm>
-            <a:off x="471489" y="6227145"/>
+            <a:off x="826266" y="7956550"/>
             <a:ext cx="2645727" cy="0"/>
           </a:xfrm>
           <a:prstGeom prst="straightConnector1">
@@ -4365,7 +4432,7 @@
         </p:nvCxnSpPr>
         <p:spPr>
           <a:xfrm flipV="1">
-            <a:off x="3283602" y="3679142"/>
+            <a:off x="3638381" y="4759439"/>
             <a:ext cx="6073059" cy="25859"/>
           </a:xfrm>
           <a:prstGeom prst="straightConnector1">
@@ -4401,8 +4468,8 @@
         </p:nvSpPr>
         <p:spPr>
           <a:xfrm>
-            <a:off x="9353543" y="3649416"/>
-            <a:ext cx="158162" cy="2312439"/>
+            <a:off x="9711435" y="4729712"/>
+            <a:ext cx="156868" cy="3074435"/>
           </a:xfrm>
           <a:prstGeom prst="rect">
             <a:avLst/>
@@ -4443,13 +4510,15 @@
       <p:cxnSp>
         <p:nvCxnSpPr>
           <p:cNvPr id="75" name="Straight Arrow Connector 74"/>
-          <p:cNvCxnSpPr/>
+          <p:cNvCxnSpPr>
+            <a:cxnSpLocks/>
+          </p:cNvCxnSpPr>
           <p:nvPr/>
         </p:nvCxnSpPr>
         <p:spPr>
-          <a:xfrm>
-            <a:off x="9518627" y="3709879"/>
-            <a:ext cx="3115578" cy="0"/>
+          <a:xfrm flipV="1">
+            <a:off x="9868303" y="5657394"/>
+            <a:ext cx="4300462" cy="13156"/>
           </a:xfrm>
           <a:prstGeom prst="straightConnector1">
             <a:avLst/>
@@ -4486,7 +4555,7 @@
         </p:nvCxnSpPr>
         <p:spPr>
           <a:xfrm>
-            <a:off x="3283602" y="5933302"/>
+            <a:off x="3638381" y="7775598"/>
             <a:ext cx="6080849" cy="28555"/>
           </a:xfrm>
           <a:prstGeom prst="straightConnector1">
@@ -4524,7 +4593,7 @@
         </p:nvSpPr>
         <p:spPr>
           <a:xfrm>
-            <a:off x="9629693" y="3436904"/>
+            <a:off x="10721001" y="5388384"/>
             <a:ext cx="2670752" cy="226216"/>
           </a:xfrm>
           <a:prstGeom prst="rect">
@@ -4580,7 +4649,7 @@
         </p:nvSpPr>
         <p:spPr>
           <a:xfrm>
-            <a:off x="6239700" y="2799734"/>
+            <a:off x="6594476" y="3880030"/>
             <a:ext cx="1222344" cy="193899"/>
           </a:xfrm>
           <a:prstGeom prst="rect">
@@ -4628,7 +4697,7 @@
         </p:nvSpPr>
         <p:spPr>
           <a:xfrm>
-            <a:off x="3262996" y="2004601"/>
+            <a:off x="3617772" y="3084898"/>
             <a:ext cx="2377606" cy="193899"/>
           </a:xfrm>
           <a:prstGeom prst="rect">
@@ -4673,7 +4742,7 @@
         </p:nvSpPr>
         <p:spPr>
           <a:xfrm>
-            <a:off x="6700045" y="5657056"/>
+            <a:off x="7054824" y="7499349"/>
             <a:ext cx="652133" cy="226216"/>
           </a:xfrm>
           <a:prstGeom prst="rect">
@@ -4713,7 +4782,7 @@
         </p:nvSpPr>
         <p:spPr>
           <a:xfrm>
-            <a:off x="2171511" y="5961856"/>
+            <a:off x="2526287" y="7691261"/>
             <a:ext cx="799924" cy="226216"/>
           </a:xfrm>
           <a:prstGeom prst="rect">
@@ -4753,7 +4822,7 @@
         </p:nvSpPr>
         <p:spPr>
           <a:xfrm>
-            <a:off x="9672022" y="5150111"/>
+            <a:off x="10026798" y="6965950"/>
             <a:ext cx="1669504" cy="484508"/>
           </a:xfrm>
           <a:prstGeom prst="rect">
@@ -4820,7 +4889,7 @@
         </p:nvSpPr>
         <p:spPr>
           <a:xfrm>
-            <a:off x="10466779" y="5634620"/>
+            <a:off x="10821558" y="7450462"/>
             <a:ext cx="159985" cy="179905"/>
           </a:xfrm>
           <a:prstGeom prst="rect">
@@ -4867,7 +4936,7 @@
         </p:nvCxnSpPr>
         <p:spPr>
           <a:xfrm>
-            <a:off x="9501703" y="5814524"/>
+            <a:off x="9856482" y="7630363"/>
             <a:ext cx="1014731" cy="0"/>
           </a:xfrm>
           <a:prstGeom prst="straightConnector1">
@@ -4905,7 +4974,7 @@
         </p:nvSpPr>
         <p:spPr>
           <a:xfrm>
-            <a:off x="5133937" y="3188343"/>
+            <a:off x="5488716" y="4268637"/>
             <a:ext cx="231309" cy="226216"/>
           </a:xfrm>
           <a:prstGeom prst="rect">
@@ -4945,7 +5014,7 @@
         </p:nvSpPr>
         <p:spPr>
           <a:xfrm>
-            <a:off x="6769619" y="1967704"/>
+            <a:off x="7124398" y="3048001"/>
             <a:ext cx="1866699" cy="521587"/>
           </a:xfrm>
           <a:prstGeom prst="rect">
@@ -5028,7 +5097,7 @@
         </p:nvCxnSpPr>
         <p:spPr>
           <a:xfrm>
-            <a:off x="5961935" y="2799735"/>
+            <a:off x="6316711" y="3880032"/>
             <a:ext cx="1676854" cy="1"/>
           </a:xfrm>
           <a:prstGeom prst="straightConnector1">
@@ -5062,7 +5131,7 @@
         </p:nvSpPr>
         <p:spPr>
           <a:xfrm>
-            <a:off x="7638790" y="2479765"/>
+            <a:off x="7993566" y="3560062"/>
             <a:ext cx="216088" cy="129295"/>
           </a:xfrm>
           <a:prstGeom prst="rect">
@@ -5111,7 +5180,7 @@
         </p:nvCxnSpPr>
         <p:spPr>
           <a:xfrm>
-            <a:off x="7746833" y="2479764"/>
+            <a:off x="8101609" y="3560061"/>
             <a:ext cx="0" cy="1039901"/>
           </a:xfrm>
           <a:prstGeom prst="line">
@@ -5148,7 +5217,7 @@
         </p:nvSpPr>
         <p:spPr>
           <a:xfrm>
-            <a:off x="7638790" y="2799734"/>
+            <a:off x="7993566" y="3880031"/>
             <a:ext cx="216088" cy="559947"/>
           </a:xfrm>
           <a:prstGeom prst="rect">
@@ -5195,7 +5264,7 @@
         </p:nvCxnSpPr>
         <p:spPr>
           <a:xfrm>
-            <a:off x="6000558" y="3353457"/>
+            <a:off x="6355334" y="4433751"/>
             <a:ext cx="1750194" cy="0"/>
           </a:xfrm>
           <a:prstGeom prst="straightConnector1">
@@ -5233,7 +5302,7 @@
         </p:nvCxnSpPr>
         <p:spPr>
           <a:xfrm>
-            <a:off x="9501703" y="5414562"/>
+            <a:off x="9856482" y="7230401"/>
             <a:ext cx="170321" cy="0"/>
           </a:xfrm>
           <a:prstGeom prst="straightConnector1">
@@ -5267,7 +5336,7 @@
         </p:nvCxnSpPr>
         <p:spPr>
           <a:xfrm>
-            <a:off x="5909272" y="2291021"/>
+            <a:off x="6264048" y="3371318"/>
             <a:ext cx="860344" cy="1"/>
           </a:xfrm>
           <a:prstGeom prst="straightConnector1">
@@ -5303,7 +5372,7 @@
         </p:nvCxnSpPr>
         <p:spPr>
           <a:xfrm>
-            <a:off x="5958711" y="2609058"/>
+            <a:off x="6313489" y="3689352"/>
             <a:ext cx="1680079" cy="0"/>
           </a:xfrm>
           <a:prstGeom prst="straightConnector1">
@@ -5341,7 +5410,7 @@
         </p:nvSpPr>
         <p:spPr>
           <a:xfrm>
-            <a:off x="7611199" y="3368697"/>
+            <a:off x="7965975" y="4448991"/>
             <a:ext cx="261610" cy="270074"/>
           </a:xfrm>
           <a:prstGeom prst="rect">
@@ -5374,7 +5443,7 @@
         </p:nvSpPr>
         <p:spPr>
           <a:xfrm>
-            <a:off x="11846107" y="2569295"/>
+            <a:off x="13391757" y="3649589"/>
             <a:ext cx="1759833" cy="364018"/>
           </a:xfrm>
           <a:prstGeom prst="rect">
@@ -5445,7 +5514,7 @@
         </p:nvSpPr>
         <p:spPr>
           <a:xfrm>
-            <a:off x="15375576" y="2736508"/>
+            <a:off x="16921226" y="3816802"/>
             <a:ext cx="1398097" cy="547322"/>
           </a:xfrm>
           <a:prstGeom prst="rect">
@@ -5527,13 +5596,16 @@
       <p:cxnSp>
         <p:nvCxnSpPr>
           <p:cNvPr id="55" name="Straight Connector 54"/>
-          <p:cNvCxnSpPr/>
+          <p:cNvCxnSpPr>
+            <a:cxnSpLocks/>
+            <a:stCxn id="53" idx="2"/>
+          </p:cNvCxnSpPr>
           <p:nvPr/>
         </p:nvCxnSpPr>
         <p:spPr>
           <a:xfrm>
-            <a:off x="12726023" y="2933314"/>
-            <a:ext cx="0" cy="3386083"/>
+            <a:off x="14271671" y="4013610"/>
+            <a:ext cx="0" cy="4019143"/>
           </a:xfrm>
           <a:prstGeom prst="line">
             <a:avLst/>
@@ -5571,7 +5643,7 @@
         </p:nvCxnSpPr>
         <p:spPr>
           <a:xfrm>
-            <a:off x="16074624" y="3188345"/>
+            <a:off x="17620271" y="4268641"/>
             <a:ext cx="0" cy="3131053"/>
           </a:xfrm>
           <a:prstGeom prst="line">
@@ -5605,13 +5677,15 @@
       <p:cxnSp>
         <p:nvCxnSpPr>
           <p:cNvPr id="57" name="Straight Arrow Connector 56"/>
-          <p:cNvCxnSpPr/>
+          <p:cNvCxnSpPr>
+            <a:cxnSpLocks/>
+          </p:cNvCxnSpPr>
           <p:nvPr/>
         </p:nvCxnSpPr>
         <p:spPr>
-          <a:xfrm flipV="1">
-            <a:off x="9516643" y="5035364"/>
-            <a:ext cx="3117562" cy="1"/>
+          <a:xfrm>
+            <a:off x="9925133" y="6737353"/>
+            <a:ext cx="4243632" cy="1"/>
           </a:xfrm>
           <a:prstGeom prst="straightConnector1">
             <a:avLst/>
@@ -5650,8 +5724,8 @@
         </p:nvSpPr>
         <p:spPr>
           <a:xfrm>
-            <a:off x="12634205" y="3709879"/>
-            <a:ext cx="183422" cy="1329640"/>
+            <a:off x="14214770" y="5627757"/>
+            <a:ext cx="148505" cy="1125117"/>
           </a:xfrm>
           <a:prstGeom prst="rect">
             <a:avLst/>
@@ -5703,7 +5777,7 @@
         </p:nvCxnSpPr>
         <p:spPr>
           <a:xfrm>
-            <a:off x="12817627" y="3759641"/>
+            <a:off x="14363274" y="5822950"/>
             <a:ext cx="3165286" cy="0"/>
           </a:xfrm>
           <a:prstGeom prst="straightConnector1">
@@ -5741,8 +5815,8 @@
         </p:nvSpPr>
         <p:spPr>
           <a:xfrm>
-            <a:off x="15982913" y="3759642"/>
-            <a:ext cx="181586" cy="1187255"/>
+            <a:off x="17528561" y="5822955"/>
+            <a:ext cx="156380" cy="837294"/>
           </a:xfrm>
           <a:prstGeom prst="rect">
             <a:avLst/>
@@ -5792,7 +5866,7 @@
         </p:nvSpPr>
         <p:spPr>
           <a:xfrm>
-            <a:off x="12792170" y="3494942"/>
+            <a:off x="14337817" y="5594350"/>
             <a:ext cx="2975674" cy="215444"/>
           </a:xfrm>
           <a:prstGeom prst="rect">
@@ -5840,74 +5914,30 @@
           </a:p>
         </p:txBody>
       </p:sp>
-      <p:sp>
-        <p:nvSpPr>
-          <p:cNvPr id="88" name="Freeform 87"/>
-          <p:cNvSpPr/>
+      <p:cxnSp>
+        <p:nvCxnSpPr>
+          <p:cNvPr id="94" name="Straight Arrow Connector 93"/>
+          <p:cNvCxnSpPr>
+            <a:cxnSpLocks/>
+            <a:endCxn id="72" idx="2"/>
+          </p:cNvCxnSpPr>
           <p:nvPr/>
-        </p:nvSpPr>
-        <p:spPr>
-          <a:xfrm rot="18999002" flipV="1">
-            <a:off x="16198061" y="3876555"/>
-            <a:ext cx="277462" cy="193667"/>
-          </a:xfrm>
-          <a:custGeom>
+        </p:nvCxnSpPr>
+        <p:spPr>
+          <a:xfrm flipV="1">
+            <a:off x="14370787" y="6660249"/>
+            <a:ext cx="3235964" cy="5556"/>
+          </a:xfrm>
+          <a:prstGeom prst="straightConnector1">
             <a:avLst/>
-            <a:gdLst>
-              <a:gd name="connsiteX0" fmla="*/ 0 w 226400"/>
-              <a:gd name="connsiteY0" fmla="*/ 32920 h 171466"/>
-              <a:gd name="connsiteX1" fmla="*/ 157018 w 226400"/>
-              <a:gd name="connsiteY1" fmla="*/ 5211 h 171466"/>
-              <a:gd name="connsiteX2" fmla="*/ 221673 w 226400"/>
-              <a:gd name="connsiteY2" fmla="*/ 125284 h 171466"/>
-              <a:gd name="connsiteX3" fmla="*/ 36945 w 226400"/>
-              <a:gd name="connsiteY3" fmla="*/ 171466 h 171466"/>
-            </a:gdLst>
-            <a:ahLst/>
-            <a:cxnLst>
-              <a:cxn ang="0">
-                <a:pos x="connsiteX0" y="connsiteY0"/>
-              </a:cxn>
-              <a:cxn ang="0">
-                <a:pos x="connsiteX1" y="connsiteY1"/>
-              </a:cxn>
-              <a:cxn ang="0">
-                <a:pos x="connsiteX2" y="connsiteY2"/>
-              </a:cxn>
-              <a:cxn ang="0">
-                <a:pos x="connsiteX3" y="connsiteY3"/>
-              </a:cxn>
-            </a:cxnLst>
-            <a:rect l="l" t="t" r="r" b="b"/>
-            <a:pathLst>
-              <a:path w="226400" h="171466">
-                <a:moveTo>
-                  <a:pt x="0" y="32920"/>
-                </a:moveTo>
-                <a:cubicBezTo>
-                  <a:pt x="60036" y="11368"/>
-                  <a:pt x="120073" y="-10183"/>
-                  <a:pt x="157018" y="5211"/>
-                </a:cubicBezTo>
-                <a:cubicBezTo>
-                  <a:pt x="193963" y="20605"/>
-                  <a:pt x="241685" y="97575"/>
-                  <a:pt x="221673" y="125284"/>
-                </a:cubicBezTo>
-                <a:cubicBezTo>
-                  <a:pt x="201661" y="152993"/>
-                  <a:pt x="119303" y="162229"/>
-                  <a:pt x="36945" y="171466"/>
-                </a:cubicBezTo>
-              </a:path>
-            </a:pathLst>
-          </a:custGeom>
+          </a:prstGeom>
           <a:ln w="19050">
             <a:solidFill>
               <a:schemeClr val="accent6">
                 <a:lumMod val="75000"/>
               </a:schemeClr>
             </a:solidFill>
+            <a:prstDash val="sysDash"/>
             <a:headEnd type="arrow" w="med" len="med"/>
             <a:tailEnd type="none" w="med" len="med"/>
           </a:ln>
@@ -5926,74 +5956,57 @@
             <a:schemeClr val="tx1"/>
           </a:fontRef>
         </p:style>
-        <p:txBody>
-          <a:bodyPr rtlCol="0" anchor="ctr"/>
-          <a:lstStyle/>
-          <a:p>
-            <a:pPr algn="ctr"/>
-            <a:endParaRPr lang="en-SG" sz="2189"/>
-          </a:p>
-        </p:txBody>
-      </p:sp>
-      <p:sp>
-        <p:nvSpPr>
-          <p:cNvPr id="89" name="Rectangle 88"/>
-          <p:cNvSpPr/>
+      </p:cxnSp>
+      <p:cxnSp>
+        <p:nvCxnSpPr>
+          <p:cNvPr id="98" name="Straight Arrow Connector 97"/>
+          <p:cNvCxnSpPr>
+            <a:cxnSpLocks/>
+          </p:cNvCxnSpPr>
           <p:nvPr/>
-        </p:nvSpPr>
-        <p:spPr>
-          <a:xfrm flipH="1">
-            <a:off x="16115383" y="4043048"/>
-            <a:ext cx="162516" cy="281007"/>
-          </a:xfrm>
-          <a:prstGeom prst="rect">
+        </p:nvCxnSpPr>
+        <p:spPr>
+          <a:xfrm flipV="1">
+            <a:off x="17673687" y="6342104"/>
+            <a:ext cx="3068804" cy="1"/>
+          </a:xfrm>
+          <a:prstGeom prst="straightConnector1">
             <a:avLst/>
           </a:prstGeom>
-          <a:solidFill>
-            <a:schemeClr val="accent6">
-              <a:lumMod val="75000"/>
-            </a:schemeClr>
-          </a:solidFill>
           <a:ln w="19050">
             <a:solidFill>
-              <a:schemeClr val="bg1"/>
+              <a:schemeClr val="accent6">
+                <a:lumMod val="75000"/>
+              </a:schemeClr>
             </a:solidFill>
+            <a:tailEnd type="arrow"/>
           </a:ln>
-          <a:effectLst/>
         </p:spPr>
         <p:style>
           <a:lnRef idx="1">
-            <a:schemeClr val="accent3"/>
+            <a:schemeClr val="accent1"/>
           </a:lnRef>
-          <a:fillRef idx="2">
-            <a:schemeClr val="accent3"/>
+          <a:fillRef idx="0">
+            <a:schemeClr val="accent1"/>
           </a:fillRef>
-          <a:effectRef idx="1">
-            <a:schemeClr val="accent3"/>
+          <a:effectRef idx="0">
+            <a:schemeClr val="accent1"/>
           </a:effectRef>
           <a:fontRef idx="minor">
-            <a:schemeClr val="dk1"/>
+            <a:schemeClr val="tx1"/>
           </a:fontRef>
         </p:style>
-        <p:txBody>
-          <a:bodyPr rtlCol="0" anchor="ctr"/>
-          <a:lstStyle/>
-          <a:p>
-            <a:pPr algn="ctr"/>
-            <a:endParaRPr lang="en-SG" sz="1470"/>
-          </a:p>
-        </p:txBody>
-      </p:sp>
-      <p:sp>
-        <p:nvSpPr>
-          <p:cNvPr id="91" name="TextBox 90"/>
+      </p:cxnSp>
+      <p:sp>
+        <p:nvSpPr>
+          <p:cNvPr id="100" name="TextBox 99"/>
           <p:cNvSpPr txBox="1"/>
           <p:nvPr/>
         </p:nvSpPr>
         <p:spPr>
           <a:xfrm>
-            <a:off x="16144195" y="3750628"/>
-            <a:ext cx="2474420" cy="226216"/>
+            <a:off x="17877322" y="6088050"/>
+            <a:ext cx="2211603" cy="226216"/>
           </a:xfrm>
           <a:prstGeom prst="rect">
             <a:avLst/>
@@ -6025,7 +6038,7 @@
                   </a:schemeClr>
                 </a:solidFill>
               </a:rPr>
-              <a:t>validateFilePath</a:t>
+              <a:t>saveDataToFile</a:t>
             </a:r>
             <a:r>
               <a:rPr lang="en-US" sz="1470" dirty="0">
@@ -6035,200 +6048,21 @@
                   </a:schemeClr>
                 </a:solidFill>
               </a:rPr>
-              <a:t>(“items.csv”)</a:t>
-            </a:r>
-          </a:p>
-        </p:txBody>
-      </p:sp>
-      <p:sp>
-        <p:nvSpPr>
-          <p:cNvPr id="92" name="Freeform 91"/>
-          <p:cNvSpPr/>
-          <p:nvPr/>
-        </p:nvSpPr>
-        <p:spPr>
-          <a:xfrm rot="1184265" flipV="1">
-            <a:off x="16223135" y="4299841"/>
-            <a:ext cx="277462" cy="193667"/>
-          </a:xfrm>
-          <a:custGeom>
-            <a:avLst/>
-            <a:gdLst>
-              <a:gd name="connsiteX0" fmla="*/ 0 w 226400"/>
-              <a:gd name="connsiteY0" fmla="*/ 32920 h 171466"/>
-              <a:gd name="connsiteX1" fmla="*/ 157018 w 226400"/>
-              <a:gd name="connsiteY1" fmla="*/ 5211 h 171466"/>
-              <a:gd name="connsiteX2" fmla="*/ 221673 w 226400"/>
-              <a:gd name="connsiteY2" fmla="*/ 125284 h 171466"/>
-              <a:gd name="connsiteX3" fmla="*/ 36945 w 226400"/>
-              <a:gd name="connsiteY3" fmla="*/ 171466 h 171466"/>
-            </a:gdLst>
-            <a:ahLst/>
-            <a:cxnLst>
-              <a:cxn ang="0">
-                <a:pos x="connsiteX0" y="connsiteY0"/>
-              </a:cxn>
-              <a:cxn ang="0">
-                <a:pos x="connsiteX1" y="connsiteY1"/>
-              </a:cxn>
-              <a:cxn ang="0">
-                <a:pos x="connsiteX2" y="connsiteY2"/>
-              </a:cxn>
-              <a:cxn ang="0">
-                <a:pos x="connsiteX3" y="connsiteY3"/>
-              </a:cxn>
-            </a:cxnLst>
-            <a:rect l="l" t="t" r="r" b="b"/>
-            <a:pathLst>
-              <a:path w="226400" h="171466">
-                <a:moveTo>
-                  <a:pt x="0" y="32920"/>
-                </a:moveTo>
-                <a:cubicBezTo>
-                  <a:pt x="60036" y="11368"/>
-                  <a:pt x="120073" y="-10183"/>
-                  <a:pt x="157018" y="5211"/>
-                </a:cubicBezTo>
-                <a:cubicBezTo>
-                  <a:pt x="193963" y="20605"/>
-                  <a:pt x="241685" y="97575"/>
-                  <a:pt x="221673" y="125284"/>
-                </a:cubicBezTo>
-                <a:cubicBezTo>
-                  <a:pt x="201661" y="152993"/>
-                  <a:pt x="119303" y="162229"/>
-                  <a:pt x="36945" y="171466"/>
-                </a:cubicBezTo>
-              </a:path>
-            </a:pathLst>
-          </a:custGeom>
-          <a:ln w="19050">
-            <a:solidFill>
-              <a:schemeClr val="accent6">
-                <a:lumMod val="75000"/>
-              </a:schemeClr>
-            </a:solidFill>
-            <a:prstDash val="sysDash"/>
-            <a:headEnd type="arrow" w="med" len="med"/>
-            <a:tailEnd type="none" w="med" len="med"/>
-          </a:ln>
-        </p:spPr>
-        <p:style>
-          <a:lnRef idx="1">
-            <a:schemeClr val="accent1"/>
-          </a:lnRef>
-          <a:fillRef idx="0">
-            <a:schemeClr val="accent1"/>
-          </a:fillRef>
-          <a:effectRef idx="0">
-            <a:schemeClr val="accent1"/>
-          </a:effectRef>
-          <a:fontRef idx="minor">
-            <a:schemeClr val="tx1"/>
-          </a:fontRef>
-        </p:style>
-        <p:txBody>
-          <a:bodyPr rtlCol="0" anchor="ctr"/>
-          <a:lstStyle/>
-          <a:p>
-            <a:pPr algn="ctr"/>
-            <a:endParaRPr lang="en-SG" sz="2189"/>
-          </a:p>
-        </p:txBody>
-      </p:sp>
-      <p:cxnSp>
-        <p:nvCxnSpPr>
-          <p:cNvPr id="94" name="Straight Arrow Connector 93"/>
-          <p:cNvCxnSpPr>
-            <a:cxnSpLocks/>
-            <a:endCxn id="72" idx="2"/>
-          </p:cNvCxnSpPr>
-          <p:nvPr/>
-        </p:nvCxnSpPr>
-        <p:spPr>
-          <a:xfrm flipV="1">
-            <a:off x="12825140" y="4946896"/>
-            <a:ext cx="3248567" cy="5554"/>
-          </a:xfrm>
-          <a:prstGeom prst="straightConnector1">
-            <a:avLst/>
-          </a:prstGeom>
-          <a:ln w="19050">
-            <a:solidFill>
-              <a:schemeClr val="accent6">
-                <a:lumMod val="75000"/>
-              </a:schemeClr>
-            </a:solidFill>
-            <a:prstDash val="sysDash"/>
-            <a:headEnd type="arrow" w="med" len="med"/>
-            <a:tailEnd type="none" w="med" len="med"/>
-          </a:ln>
-        </p:spPr>
-        <p:style>
-          <a:lnRef idx="1">
-            <a:schemeClr val="accent1"/>
-          </a:lnRef>
-          <a:fillRef idx="0">
-            <a:schemeClr val="accent1"/>
-          </a:fillRef>
-          <a:effectRef idx="0">
-            <a:schemeClr val="accent1"/>
-          </a:effectRef>
-          <a:fontRef idx="minor">
-            <a:schemeClr val="tx1"/>
-          </a:fontRef>
-        </p:style>
-      </p:cxnSp>
-      <p:cxnSp>
-        <p:nvCxnSpPr>
-          <p:cNvPr id="98" name="Straight Arrow Connector 97"/>
-          <p:cNvCxnSpPr>
-            <a:cxnSpLocks/>
-          </p:cNvCxnSpPr>
-          <p:nvPr/>
-        </p:nvCxnSpPr>
-        <p:spPr>
-          <a:xfrm flipV="1">
-            <a:off x="16128040" y="4628748"/>
-            <a:ext cx="3068804" cy="1"/>
-          </a:xfrm>
-          <a:prstGeom prst="straightConnector1">
-            <a:avLst/>
-          </a:prstGeom>
-          <a:ln w="19050">
-            <a:solidFill>
-              <a:schemeClr val="accent6">
-                <a:lumMod val="75000"/>
-              </a:schemeClr>
-            </a:solidFill>
-            <a:tailEnd type="arrow"/>
-          </a:ln>
-        </p:spPr>
-        <p:style>
-          <a:lnRef idx="1">
-            <a:schemeClr val="accent1"/>
-          </a:lnRef>
-          <a:fillRef idx="0">
-            <a:schemeClr val="accent1"/>
-          </a:fillRef>
-          <a:effectRef idx="0">
-            <a:schemeClr val="accent1"/>
-          </a:effectRef>
-          <a:fontRef idx="minor">
-            <a:schemeClr val="tx1"/>
-          </a:fontRef>
-        </p:style>
-      </p:cxnSp>
-      <p:sp>
-        <p:nvSpPr>
-          <p:cNvPr id="100" name="TextBox 99"/>
+              <a:t>(data, path)</a:t>
+            </a:r>
+          </a:p>
+        </p:txBody>
+      </p:sp>
+      <p:sp>
+        <p:nvSpPr>
+          <p:cNvPr id="101" name="TextBox 100"/>
           <p:cNvSpPr txBox="1"/>
           <p:nvPr/>
         </p:nvSpPr>
         <p:spPr>
           <a:xfrm>
-            <a:off x="16331672" y="4374698"/>
-            <a:ext cx="2211603" cy="226216"/>
+            <a:off x="17944738" y="6339707"/>
+            <a:ext cx="1640631" cy="226216"/>
           </a:xfrm>
           <a:prstGeom prst="rect">
             <a:avLst/>
@@ -6253,16 +6087,6 @@
           </a:lstStyle>
           <a:p>
             <a:r>
-              <a:rPr lang="en-US" sz="1470" dirty="0" err="1">
-                <a:solidFill>
-                  <a:schemeClr val="accent6">
-                    <a:lumMod val="75000"/>
-                  </a:schemeClr>
-                </a:solidFill>
-              </a:rPr>
-              <a:t>saveDataToFile</a:t>
-            </a:r>
-            <a:r>
               <a:rPr lang="en-US" sz="1470" dirty="0">
                 <a:solidFill>
                   <a:schemeClr val="accent6">
@@ -6270,21 +6094,242 @@
                   </a:schemeClr>
                 </a:solidFill>
               </a:rPr>
-              <a:t>(data, path)</a:t>
-            </a:r>
-          </a:p>
-        </p:txBody>
-      </p:sp>
-      <p:sp>
-        <p:nvSpPr>
-          <p:cNvPr id="101" name="TextBox 100"/>
+              <a:t>Saves data to file</a:t>
+            </a:r>
+          </a:p>
+        </p:txBody>
+      </p:sp>
+      <p:sp>
+        <p:nvSpPr>
+          <p:cNvPr id="66" name="Rectangle 62">
+            <a:extLst>
+              <a:ext uri="{FF2B5EF4-FFF2-40B4-BE49-F238E27FC236}">
+                <a16:creationId xmlns:a16="http://schemas.microsoft.com/office/drawing/2014/main" id="{22C39C19-79F8-46A5-9515-FC81C8D37AC1}"/>
+              </a:ext>
+            </a:extLst>
+          </p:cNvPr>
+          <p:cNvSpPr/>
+          <p:nvPr/>
+        </p:nvSpPr>
+        <p:spPr>
+          <a:xfrm>
+            <a:off x="11889503" y="2546353"/>
+            <a:ext cx="1224405" cy="391311"/>
+          </a:xfrm>
+          <a:prstGeom prst="rect">
+            <a:avLst/>
+          </a:prstGeom>
+          <a:solidFill>
+            <a:srgbClr val="31859C"/>
+          </a:solidFill>
+          <a:ln w="19050">
+            <a:solidFill>
+              <a:srgbClr val="87C7D9"/>
+            </a:solidFill>
+          </a:ln>
+          <a:effectLst/>
+        </p:spPr>
+        <p:style>
+          <a:lnRef idx="1">
+            <a:schemeClr val="accent2"/>
+          </a:lnRef>
+          <a:fillRef idx="2">
+            <a:schemeClr val="accent2"/>
+          </a:fillRef>
+          <a:effectRef idx="1">
+            <a:schemeClr val="accent2"/>
+          </a:effectRef>
+          <a:fontRef idx="minor">
+            <a:schemeClr val="dk1"/>
+          </a:fontRef>
+        </p:style>
+        <p:txBody>
+          <a:bodyPr rtlCol="0" anchor="ctr"/>
+          <a:lstStyle/>
+          <a:p>
+            <a:pPr algn="ctr"/>
+            <a:r>
+              <a:rPr lang="en-US" sz="1680" dirty="0">
+                <a:solidFill>
+                  <a:schemeClr val="bg1"/>
+                </a:solidFill>
+              </a:rPr>
+              <a:t>:</a:t>
+            </a:r>
+            <a:r>
+              <a:rPr lang="en-US" sz="1680" dirty="0" err="1">
+                <a:solidFill>
+                  <a:schemeClr val="bg1"/>
+                </a:solidFill>
+              </a:rPr>
+              <a:t>FileUtil</a:t>
+            </a:r>
+            <a:endParaRPr lang="en-SG" sz="1680" dirty="0">
+              <a:solidFill>
+                <a:schemeClr val="bg1"/>
+              </a:solidFill>
+            </a:endParaRPr>
+          </a:p>
+        </p:txBody>
+      </p:sp>
+      <p:cxnSp>
+        <p:nvCxnSpPr>
+          <p:cNvPr id="76" name="Straight Arrow Connector 74">
+            <a:extLst>
+              <a:ext uri="{FF2B5EF4-FFF2-40B4-BE49-F238E27FC236}">
+                <a16:creationId xmlns:a16="http://schemas.microsoft.com/office/drawing/2014/main" id="{A2CE2182-902C-4CB4-9C95-6A83D7094902}"/>
+              </a:ext>
+            </a:extLst>
+          </p:cNvPr>
+          <p:cNvCxnSpPr>
+            <a:cxnSpLocks/>
+          </p:cNvCxnSpPr>
+          <p:nvPr/>
+        </p:nvCxnSpPr>
+        <p:spPr>
+          <a:xfrm flipV="1">
+            <a:off x="9786555" y="4816666"/>
+            <a:ext cx="2601104" cy="9143"/>
+          </a:xfrm>
+          <a:prstGeom prst="straightConnector1">
+            <a:avLst/>
+          </a:prstGeom>
+          <a:ln w="19050">
+            <a:solidFill>
+              <a:srgbClr val="0070C0"/>
+            </a:solidFill>
+            <a:tailEnd type="arrow"/>
+          </a:ln>
+        </p:spPr>
+        <p:style>
+          <a:lnRef idx="1">
+            <a:schemeClr val="accent1"/>
+          </a:lnRef>
+          <a:fillRef idx="0">
+            <a:schemeClr val="accent1"/>
+          </a:fillRef>
+          <a:effectRef idx="0">
+            <a:schemeClr val="accent1"/>
+          </a:effectRef>
+          <a:fontRef idx="minor">
+            <a:schemeClr val="tx1"/>
+          </a:fontRef>
+        </p:style>
+      </p:cxnSp>
+      <p:cxnSp>
+        <p:nvCxnSpPr>
+          <p:cNvPr id="85" name="Straight Connector 54">
+            <a:extLst>
+              <a:ext uri="{FF2B5EF4-FFF2-40B4-BE49-F238E27FC236}">
+                <a16:creationId xmlns:a16="http://schemas.microsoft.com/office/drawing/2014/main" id="{6B8CF8B8-49AE-4C19-8763-E5692512DBFA}"/>
+              </a:ext>
+            </a:extLst>
+          </p:cNvPr>
+          <p:cNvCxnSpPr>
+            <a:cxnSpLocks/>
+          </p:cNvCxnSpPr>
+          <p:nvPr/>
+        </p:nvCxnSpPr>
+        <p:spPr>
+          <a:xfrm flipH="1">
+            <a:off x="12501006" y="2946807"/>
+            <a:ext cx="26577" cy="2481991"/>
+          </a:xfrm>
+          <a:prstGeom prst="line">
+            <a:avLst/>
+          </a:prstGeom>
+          <a:ln w="19050">
+            <a:solidFill>
+              <a:srgbClr val="31859C"/>
+            </a:solidFill>
+            <a:prstDash val="sysDash"/>
+          </a:ln>
+          <a:effectLst/>
+        </p:spPr>
+        <p:style>
+          <a:lnRef idx="1">
+            <a:schemeClr val="accent1"/>
+          </a:lnRef>
+          <a:fillRef idx="2">
+            <a:schemeClr val="accent1"/>
+          </a:fillRef>
+          <a:effectRef idx="1">
+            <a:schemeClr val="accent1"/>
+          </a:effectRef>
+          <a:fontRef idx="minor">
+            <a:schemeClr val="dk1"/>
+          </a:fontRef>
+        </p:style>
+      </p:cxnSp>
+      <p:sp>
+        <p:nvSpPr>
+          <p:cNvPr id="87" name="Rectangle 59">
+            <a:extLst>
+              <a:ext uri="{FF2B5EF4-FFF2-40B4-BE49-F238E27FC236}">
+                <a16:creationId xmlns:a16="http://schemas.microsoft.com/office/drawing/2014/main" id="{1BC20DA4-AC31-4F12-86D9-E06D02171CF0}"/>
+              </a:ext>
+            </a:extLst>
+          </p:cNvPr>
+          <p:cNvSpPr/>
+          <p:nvPr/>
+        </p:nvSpPr>
+        <p:spPr>
+          <a:xfrm>
+            <a:off x="12398154" y="4759437"/>
+            <a:ext cx="189853" cy="456415"/>
+          </a:xfrm>
+          <a:prstGeom prst="rect">
+            <a:avLst/>
+          </a:prstGeom>
+          <a:solidFill>
+            <a:srgbClr val="31859C"/>
+          </a:solidFill>
+          <a:ln>
+            <a:solidFill>
+              <a:srgbClr val="31859C"/>
+            </a:solidFill>
+          </a:ln>
+          <a:effectLst/>
+        </p:spPr>
+        <p:style>
+          <a:lnRef idx="1">
+            <a:schemeClr val="accent3"/>
+          </a:lnRef>
+          <a:fillRef idx="2">
+            <a:schemeClr val="accent3"/>
+          </a:fillRef>
+          <a:effectRef idx="1">
+            <a:schemeClr val="accent3"/>
+          </a:effectRef>
+          <a:fontRef idx="minor">
+            <a:schemeClr val="dk1"/>
+          </a:fontRef>
+        </p:style>
+        <p:txBody>
+          <a:bodyPr rtlCol="0" anchor="ctr"/>
+          <a:lstStyle/>
+          <a:p>
+            <a:pPr algn="ctr"/>
+            <a:endParaRPr lang="en-SG" sz="1470"/>
+          </a:p>
+        </p:txBody>
+      </p:sp>
+      <p:sp>
+        <p:nvSpPr>
+          <p:cNvPr id="95" name="TextBox 73">
+            <a:extLst>
+              <a:ext uri="{FF2B5EF4-FFF2-40B4-BE49-F238E27FC236}">
+                <a16:creationId xmlns:a16="http://schemas.microsoft.com/office/drawing/2014/main" id="{76A19361-FA0C-4F18-8181-A43528FD9A3A}"/>
+              </a:ext>
+            </a:extLst>
+          </p:cNvPr>
           <p:cNvSpPr txBox="1"/>
           <p:nvPr/>
         </p:nvSpPr>
         <p:spPr>
           <a:xfrm>
-            <a:off x="16399088" y="4626354"/>
-            <a:ext cx="1640631" cy="226216"/>
+            <a:off x="9218552" y="4543993"/>
+            <a:ext cx="2975674" cy="215444"/>
           </a:xfrm>
           <a:prstGeom prst="rect">
             <a:avLst/>
@@ -6309,18 +6354,70 @@
           </a:lstStyle>
           <a:p>
             <a:r>
-              <a:rPr lang="en-US" sz="1470" dirty="0">
+              <a:rPr lang="en-US" altLang="zh-CN" dirty="0" err="1">
                 <a:solidFill>
-                  <a:schemeClr val="accent6">
-                    <a:lumMod val="75000"/>
-                  </a:schemeClr>
+                  <a:srgbClr val="31859C"/>
                 </a:solidFill>
               </a:rPr>
-              <a:t>Saves data to file</a:t>
-            </a:r>
-          </a:p>
-        </p:txBody>
-      </p:sp>
+              <a:t>isValidCsVFIle</a:t>
+            </a:r>
+            <a:r>
+              <a:rPr lang="en-US" altLang="zh-CN" dirty="0">
+                <a:solidFill>
+                  <a:srgbClr val="31859C"/>
+                </a:solidFill>
+              </a:rPr>
+              <a:t>( “items.csv”)</a:t>
+            </a:r>
+          </a:p>
+        </p:txBody>
+      </p:sp>
+      <p:cxnSp>
+        <p:nvCxnSpPr>
+          <p:cNvPr id="96" name="Straight Arrow Connector 93">
+            <a:extLst>
+              <a:ext uri="{FF2B5EF4-FFF2-40B4-BE49-F238E27FC236}">
+                <a16:creationId xmlns:a16="http://schemas.microsoft.com/office/drawing/2014/main" id="{0AE9F9E5-8AE7-4A88-8713-D745171160AB}"/>
+              </a:ext>
+            </a:extLst>
+          </p:cNvPr>
+          <p:cNvCxnSpPr>
+            <a:cxnSpLocks/>
+          </p:cNvCxnSpPr>
+          <p:nvPr/>
+        </p:nvCxnSpPr>
+        <p:spPr>
+          <a:xfrm flipV="1">
+            <a:off x="9868303" y="5192696"/>
+            <a:ext cx="2498929" cy="15783"/>
+          </a:xfrm>
+          <a:prstGeom prst="straightConnector1">
+            <a:avLst/>
+          </a:prstGeom>
+          <a:ln w="19050">
+            <a:solidFill>
+              <a:srgbClr val="31859C"/>
+            </a:solidFill>
+            <a:prstDash val="sysDash"/>
+            <a:headEnd type="arrow" w="med" len="med"/>
+            <a:tailEnd type="none" w="med" len="med"/>
+          </a:ln>
+        </p:spPr>
+        <p:style>
+          <a:lnRef idx="1">
+            <a:schemeClr val="accent1"/>
+          </a:lnRef>
+          <a:fillRef idx="0">
+            <a:schemeClr val="accent1"/>
+          </a:fillRef>
+          <a:effectRef idx="0">
+            <a:schemeClr val="accent1"/>
+          </a:effectRef>
+          <a:fontRef idx="minor">
+            <a:schemeClr val="tx1"/>
+          </a:fontRef>
+        </p:style>
+      </p:cxnSp>
     </p:spTree>
     <p:extLst>
       <p:ext uri="{BB962C8B-B14F-4D97-AF65-F5344CB8AC3E}">

</xml_diff>

<commit_message>
Update User Guide as mentioned
</commit_message>
<xml_diff>
--- a/docs/diagrams/ExportCsvItemCommandSequenceDiagram.pptx
+++ b/docs/diagrams/ExportCsvItemCommandSequenceDiagram.pptx
@@ -208,7 +208,7 @@
           <a:p>
             <a:fld id="{F5CC4B3F-88C1-4FFA-B1B6-F41C21DC6924}" type="datetimeFigureOut">
               <a:rPr lang="en-US" smtClean="0"/>
-              <a:t>10/16/2018</a:t>
+              <a:t>10/21/2018</a:t>
             </a:fld>
             <a:endParaRPr lang="en-US"/>
           </a:p>
@@ -654,7 +654,7 @@
           <a:p>
             <a:fld id="{78C97017-6FC3-485B-9764-EAC9E56C1D49}" type="datetimeFigureOut">
               <a:rPr lang="en-US" smtClean="0"/>
-              <a:t>10/16/2018</a:t>
+              <a:t>10/21/2018</a:t>
             </a:fld>
             <a:endParaRPr lang="en-US"/>
           </a:p>
@@ -822,7 +822,7 @@
           <a:p>
             <a:fld id="{78C97017-6FC3-485B-9764-EAC9E56C1D49}" type="datetimeFigureOut">
               <a:rPr lang="en-US" smtClean="0"/>
-              <a:t>10/16/2018</a:t>
+              <a:t>10/21/2018</a:t>
             </a:fld>
             <a:endParaRPr lang="en-US"/>
           </a:p>
@@ -1000,7 +1000,7 @@
           <a:p>
             <a:fld id="{78C97017-6FC3-485B-9764-EAC9E56C1D49}" type="datetimeFigureOut">
               <a:rPr lang="en-US" smtClean="0"/>
-              <a:t>10/16/2018</a:t>
+              <a:t>10/21/2018</a:t>
             </a:fld>
             <a:endParaRPr lang="en-US"/>
           </a:p>
@@ -1168,7 +1168,7 @@
           <a:p>
             <a:fld id="{78C97017-6FC3-485B-9764-EAC9E56C1D49}" type="datetimeFigureOut">
               <a:rPr lang="en-US" smtClean="0"/>
-              <a:t>10/16/2018</a:t>
+              <a:t>10/21/2018</a:t>
             </a:fld>
             <a:endParaRPr lang="en-US"/>
           </a:p>
@@ -1413,7 +1413,7 @@
           <a:p>
             <a:fld id="{78C97017-6FC3-485B-9764-EAC9E56C1D49}" type="datetimeFigureOut">
               <a:rPr lang="en-US" smtClean="0"/>
-              <a:t>10/16/2018</a:t>
+              <a:t>10/21/2018</a:t>
             </a:fld>
             <a:endParaRPr lang="en-US"/>
           </a:p>
@@ -1698,7 +1698,7 @@
           <a:p>
             <a:fld id="{78C97017-6FC3-485B-9764-EAC9E56C1D49}" type="datetimeFigureOut">
               <a:rPr lang="en-US" smtClean="0"/>
-              <a:t>10/16/2018</a:t>
+              <a:t>10/21/2018</a:t>
             </a:fld>
             <a:endParaRPr lang="en-US"/>
           </a:p>
@@ -2117,7 +2117,7 @@
           <a:p>
             <a:fld id="{78C97017-6FC3-485B-9764-EAC9E56C1D49}" type="datetimeFigureOut">
               <a:rPr lang="en-US" smtClean="0"/>
-              <a:t>10/16/2018</a:t>
+              <a:t>10/21/2018</a:t>
             </a:fld>
             <a:endParaRPr lang="en-US"/>
           </a:p>
@@ -2234,7 +2234,7 @@
           <a:p>
             <a:fld id="{78C97017-6FC3-485B-9764-EAC9E56C1D49}" type="datetimeFigureOut">
               <a:rPr lang="en-US" smtClean="0"/>
-              <a:t>10/16/2018</a:t>
+              <a:t>10/21/2018</a:t>
             </a:fld>
             <a:endParaRPr lang="en-US"/>
           </a:p>
@@ -2329,7 +2329,7 @@
           <a:p>
             <a:fld id="{78C97017-6FC3-485B-9764-EAC9E56C1D49}" type="datetimeFigureOut">
               <a:rPr lang="en-US" smtClean="0"/>
-              <a:t>10/16/2018</a:t>
+              <a:t>10/21/2018</a:t>
             </a:fld>
             <a:endParaRPr lang="en-US"/>
           </a:p>
@@ -2604,7 +2604,7 @@
           <a:p>
             <a:fld id="{78C97017-6FC3-485B-9764-EAC9E56C1D49}" type="datetimeFigureOut">
               <a:rPr lang="en-US" smtClean="0"/>
-              <a:t>10/16/2018</a:t>
+              <a:t>10/21/2018</a:t>
             </a:fld>
             <a:endParaRPr lang="en-US"/>
           </a:p>
@@ -2856,7 +2856,7 @@
           <a:p>
             <a:fld id="{78C97017-6FC3-485B-9764-EAC9E56C1D49}" type="datetimeFigureOut">
               <a:rPr lang="en-US" smtClean="0"/>
-              <a:t>10/16/2018</a:t>
+              <a:t>10/21/2018</a:t>
             </a:fld>
             <a:endParaRPr lang="en-US"/>
           </a:p>
@@ -3067,7 +3067,7 @@
           <a:p>
             <a:fld id="{78C97017-6FC3-485B-9764-EAC9E56C1D49}" type="datetimeFigureOut">
               <a:rPr lang="en-US" smtClean="0"/>
-              <a:t>10/16/2018</a:t>
+              <a:t>10/21/2018</a:t>
             </a:fld>
             <a:endParaRPr lang="en-US"/>
           </a:p>
@@ -3457,7 +3457,7 @@
         <p:spPr>
           <a:xfrm>
             <a:off x="11817129" y="2146090"/>
-            <a:ext cx="1420909" cy="5962861"/>
+            <a:ext cx="1457720" cy="5962861"/>
           </a:xfrm>
           <a:prstGeom prst="roundRect">
             <a:avLst>
@@ -3514,8 +3514,8 @@
         </p:nvSpPr>
         <p:spPr>
           <a:xfrm>
-            <a:off x="13238956" y="2120197"/>
-            <a:ext cx="7042350" cy="5962859"/>
+            <a:off x="13276280" y="2146090"/>
+            <a:ext cx="7042350" cy="5962862"/>
           </a:xfrm>
           <a:prstGeom prst="roundRect">
             <a:avLst>
@@ -3988,7 +3988,7 @@
                   <a:schemeClr val="bg1"/>
                 </a:solidFill>
               </a:rPr>
-              <a:t>e:ExportCsvItems</a:t>
+              <a:t>:ExportCsvItems</a:t>
             </a:r>
             <a:br>
               <a:rPr lang="en-US" sz="1680" dirty="0">
@@ -4111,7 +4111,7 @@
         <p:spPr>
           <a:xfrm>
             <a:off x="859272" y="3201156"/>
-            <a:ext cx="2612720" cy="3871"/>
+            <a:ext cx="2578535" cy="0"/>
           </a:xfrm>
           <a:prstGeom prst="straightConnector1">
             <a:avLst/>
@@ -4149,7 +4149,7 @@
         <p:spPr>
           <a:xfrm>
             <a:off x="3566365" y="3317875"/>
-            <a:ext cx="2526928" cy="0"/>
+            <a:ext cx="2563492" cy="0"/>
           </a:xfrm>
           <a:prstGeom prst="straightConnector1">
             <a:avLst/>
@@ -4468,8 +4468,8 @@
         </p:nvSpPr>
         <p:spPr>
           <a:xfrm>
-            <a:off x="9711435" y="4729712"/>
-            <a:ext cx="156868" cy="3074435"/>
+            <a:off x="9708318" y="4758316"/>
+            <a:ext cx="159985" cy="3045831"/>
           </a:xfrm>
           <a:prstGeom prst="rect">
             <a:avLst/>
@@ -4517,8 +4517,8 @@
         </p:nvCxnSpPr>
         <p:spPr>
           <a:xfrm flipV="1">
-            <a:off x="9868303" y="5657394"/>
-            <a:ext cx="4300462" cy="13156"/>
+            <a:off x="9868303" y="5654767"/>
+            <a:ext cx="4337223" cy="15783"/>
           </a:xfrm>
           <a:prstGeom prst="straightConnector1">
             <a:avLst/>
@@ -5679,13 +5679,14 @@
           <p:cNvPr id="57" name="Straight Arrow Connector 56"/>
           <p:cNvCxnSpPr>
             <a:cxnSpLocks/>
+            <a:endCxn id="60" idx="2"/>
           </p:cNvCxnSpPr>
           <p:nvPr/>
         </p:nvCxnSpPr>
         <p:spPr>
           <a:xfrm>
-            <a:off x="9925133" y="6737353"/>
-            <a:ext cx="4243632" cy="1"/>
+            <a:off x="9868303" y="6745072"/>
+            <a:ext cx="4415525" cy="0"/>
           </a:xfrm>
           <a:prstGeom prst="straightConnector1">
             <a:avLst/>
@@ -5724,8 +5725,8 @@
         </p:nvSpPr>
         <p:spPr>
           <a:xfrm>
-            <a:off x="14214770" y="5627757"/>
-            <a:ext cx="148505" cy="1125117"/>
+            <a:off x="14204380" y="5654768"/>
+            <a:ext cx="158896" cy="1090304"/>
           </a:xfrm>
           <a:prstGeom prst="rect">
             <a:avLst/>
@@ -5924,9 +5925,9 @@
           <p:nvPr/>
         </p:nvCxnSpPr>
         <p:spPr>
-          <a:xfrm flipV="1">
-            <a:off x="14370787" y="6660249"/>
-            <a:ext cx="3235964" cy="5556"/>
+          <a:xfrm>
+            <a:off x="14363274" y="6660249"/>
+            <a:ext cx="3243477" cy="0"/>
           </a:xfrm>
           <a:prstGeom prst="straightConnector1">
             <a:avLst/>
@@ -6188,8 +6189,8 @@
         </p:nvCxnSpPr>
         <p:spPr>
           <a:xfrm flipV="1">
-            <a:off x="9786555" y="4816666"/>
-            <a:ext cx="2601104" cy="9143"/>
+            <a:off x="9786555" y="4810026"/>
+            <a:ext cx="2608380" cy="15784"/>
           </a:xfrm>
           <a:prstGeom prst="straightConnector1">
             <a:avLst/>
@@ -6275,8 +6276,8 @@
         </p:nvSpPr>
         <p:spPr>
           <a:xfrm>
-            <a:off x="12398154" y="4759437"/>
-            <a:ext cx="189853" cy="456415"/>
+            <a:off x="12394935" y="4810026"/>
+            <a:ext cx="193073" cy="405827"/>
           </a:xfrm>
           <a:prstGeom prst="rect">
             <a:avLst/>

</xml_diff>